<commit_message>
Site updated: 2021-07-21 20:07:05
</commit_message>
<xml_diff>
--- a/2021/07/17/Chen_Stochastic_Sparse_Subspace_Clustering_CVPR_2020_paper/Presentation.pptx
+++ b/2021/07/17/Chen_Stochastic_Sparse_Subspace_Clustering_CVPR_2020_paper/Presentation.pptx
@@ -221,7 +221,7 @@
           <a:p>
             <a:fld id="{38F98C64-0CDA-4216-98B8-25056106FB9D}" type="datetimeFigureOut">
               <a:rPr lang="zh-CN" altLang="en-US" smtClean="0"/>
-              <a:t>2021/7/18</a:t>
+              <a:t>2021/7/21</a:t>
             </a:fld>
             <a:endParaRPr lang="zh-CN" altLang="en-US"/>
           </a:p>
@@ -669,7 +669,7 @@
             </a:r>
             <a:r>
               <a:rPr lang="zh-CN" altLang="en-US" dirty="0"/>
-              <a:t>的作用是丢弃字典</a:t>
+              <a:t>的作用是丢弃数组矩阵</a:t>
             </a:r>
             <a:r>
               <a:rPr lang="en-US" altLang="zh-CN" dirty="0"/>
@@ -819,7 +819,7 @@
           <a:p>
             <a:r>
               <a:rPr lang="zh-CN" altLang="en-US" dirty="0"/>
-              <a:t>如果我们对这个式子求期望的化，我们可以把它化简成这个。并且，如果数据已经被预处理过，即数据矩阵</a:t>
+              <a:t>如果我们对这个式子求期望的话，我们可以把它化简成这个。并且，如果数据已经被预处理过，即数据矩阵</a:t>
             </a:r>
             <a:r>
               <a:rPr lang="en-US" altLang="zh-CN" dirty="0"/>
@@ -1023,7 +1023,7 @@
           <a:p>
             <a:r>
               <a:rPr lang="zh-CN" altLang="en-US" dirty="0"/>
-              <a:t>我们先把期望转化为样本的均值，再加上稀疏子空间聚类的约束，即求解如下优化问题：</a:t>
+              <a:t>为了实际运算，将求期望转化为样本的均值，再加上稀疏子空间聚类的约束，即求解如下优化问题：</a:t>
             </a:r>
             <a:endParaRPr lang="en-US" altLang="zh-CN" dirty="0"/>
           </a:p>
@@ -1117,7 +1117,7 @@
           <a:p>
             <a:r>
               <a:rPr lang="zh-CN" altLang="en-US" dirty="0"/>
-              <a:t>接下来是如何求解这个优化问题。</a:t>
+              <a:t>接下来是作者提出了求解这个优化问题的共识算法。。</a:t>
             </a:r>
             <a:endParaRPr lang="en-US" altLang="zh-CN" dirty="0"/>
           </a:p>
@@ -1272,7 +1272,122 @@
           <a:bodyPr/>
           <a:lstStyle/>
           <a:p>
-            <a:endParaRPr lang="zh-CN" altLang="en-US" dirty="0"/>
+            <a:r>
+              <a:rPr lang="zh-CN" altLang="en-US" dirty="0"/>
+              <a:t>作者通过交替更新</a:t>
+            </a:r>
+            <a:r>
+              <a:rPr lang="en-US" altLang="zh-CN" dirty="0" err="1"/>
+              <a:t>bj</a:t>
+            </a:r>
+            <a:r>
+              <a:rPr lang="zh-CN" altLang="en-US" dirty="0"/>
+              <a:t>和</a:t>
+            </a:r>
+            <a:r>
+              <a:rPr lang="en-US" altLang="zh-CN" dirty="0" err="1"/>
+              <a:t>cj</a:t>
+            </a:r>
+            <a:r>
+              <a:rPr lang="zh-CN" altLang="en-US" dirty="0"/>
+              <a:t>来求解这个问题，第一步固定</a:t>
+            </a:r>
+            <a:r>
+              <a:rPr lang="en-US" altLang="zh-CN" dirty="0" err="1"/>
+              <a:t>cj</a:t>
+            </a:r>
+            <a:r>
+              <a:rPr lang="zh-CN" altLang="en-US" dirty="0"/>
+              <a:t>，来更新</a:t>
+            </a:r>
+            <a:r>
+              <a:rPr lang="en-US" altLang="zh-CN" dirty="0" err="1"/>
+              <a:t>bj</a:t>
+            </a:r>
+            <a:r>
+              <a:rPr lang="zh-CN" altLang="en-US" dirty="0"/>
+              <a:t>。优化问题就变成了这个式子。这时候对于</a:t>
+            </a:r>
+            <a:r>
+              <a:rPr lang="en-US" altLang="zh-CN" dirty="0"/>
+              <a:t>t</a:t>
+            </a:r>
+            <a:r>
+              <a:rPr lang="zh-CN" altLang="en-US" dirty="0"/>
+              <a:t>个子问题来说，求解它们的</a:t>
+            </a:r>
+            <a:r>
+              <a:rPr lang="en-US" altLang="zh-CN" dirty="0" err="1"/>
+              <a:t>bj</a:t>
+            </a:r>
+            <a:r>
+              <a:rPr lang="zh-CN" altLang="en-US" dirty="0"/>
+              <a:t>的方法都是一样的，所以可以只考虑其中一个子问题的求解，去掉参数</a:t>
+            </a:r>
+            <a:r>
+              <a:rPr lang="en-US" altLang="zh-CN" dirty="0"/>
+              <a:t>t</a:t>
+            </a:r>
+            <a:r>
+              <a:rPr lang="zh-CN" altLang="en-US" dirty="0"/>
+              <a:t>。这里引入了一个新的符号大写的</a:t>
+            </a:r>
+            <a:r>
+              <a:rPr lang="en-US" altLang="zh-CN" dirty="0" err="1"/>
+              <a:t>kesi</a:t>
+            </a:r>
+            <a:r>
+              <a:rPr lang="zh-CN" altLang="en-US" dirty="0"/>
+              <a:t>，它代表的是数据矩阵</a:t>
+            </a:r>
+            <a:r>
+              <a:rPr lang="en-US" altLang="zh-CN" dirty="0"/>
+              <a:t>X</a:t>
+            </a:r>
+            <a:r>
+              <a:rPr lang="zh-CN" altLang="en-US" dirty="0"/>
+              <a:t>乘以</a:t>
+            </a:r>
+            <a:r>
+              <a:rPr lang="en-US" altLang="zh-CN" dirty="0"/>
+              <a:t>dropout</a:t>
+            </a:r>
+            <a:r>
+              <a:rPr lang="zh-CN" altLang="en-US" dirty="0"/>
+              <a:t>后剩下的列。问题就转变成了如何求解这个优化问题。这里，作者提出了一个类似于</a:t>
+            </a:r>
+            <a:r>
+              <a:rPr lang="en-US" altLang="zh-CN" dirty="0"/>
+              <a:t>OMP</a:t>
+            </a:r>
+            <a:r>
+              <a:rPr lang="zh-CN" altLang="en-US" dirty="0"/>
+              <a:t>的算法来进行迭代。先通过这个公式选择出一个</a:t>
+            </a:r>
+            <a:r>
+              <a:rPr lang="en-US" altLang="zh-CN" dirty="0" err="1"/>
+              <a:t>i</a:t>
+            </a:r>
+            <a:r>
+              <a:rPr lang="zh-CN" altLang="en-US" dirty="0"/>
+              <a:t>，把它加入到支持集中，再由这个公式来更新</a:t>
+            </a:r>
+            <a:r>
+              <a:rPr lang="en-US" altLang="zh-CN" dirty="0" err="1"/>
+              <a:t>bj</a:t>
+            </a:r>
+            <a:r>
+              <a:rPr lang="zh-CN" altLang="en-US" dirty="0"/>
+              <a:t>，最后更新残差。重复这个过程直到收敛。论文中，这个算法被称为</a:t>
+            </a:r>
+            <a:r>
+              <a:rPr lang="en-US" altLang="zh-CN" dirty="0"/>
+              <a:t>Damped OMP</a:t>
+            </a:r>
+            <a:r>
+              <a:rPr lang="zh-CN" altLang="en-US" dirty="0"/>
+              <a:t>。</a:t>
+            </a:r>
           </a:p>
         </p:txBody>
       </p:sp>
@@ -1358,7 +1473,55 @@
           <a:p>
             <a:r>
               <a:rPr lang="zh-CN" altLang="en-US" dirty="0"/>
-              <a:t>这两个步骤交替进行直到算法收敛。这样就得到随机稀疏子空间聚类的系数解，再求亲和矩阵进行谱聚类。</a:t>
+              <a:t>第一步中，我们是固定</a:t>
+            </a:r>
+            <a:r>
+              <a:rPr lang="en-US" altLang="zh-CN" dirty="0" err="1"/>
+              <a:t>c_j</a:t>
+            </a:r>
+            <a:r>
+              <a:rPr lang="zh-CN" altLang="en-US" dirty="0"/>
+              <a:t>来求</a:t>
+            </a:r>
+            <a:r>
+              <a:rPr lang="en-US" altLang="zh-CN" dirty="0" err="1"/>
+              <a:t>bj</a:t>
+            </a:r>
+            <a:r>
+              <a:rPr lang="zh-CN" altLang="en-US" dirty="0"/>
+              <a:t>。第二步中，固定</a:t>
+            </a:r>
+            <a:r>
+              <a:rPr lang="en-US" altLang="zh-CN" dirty="0" err="1"/>
+              <a:t>b_j</a:t>
+            </a:r>
+            <a:r>
+              <a:rPr lang="zh-CN" altLang="en-US" dirty="0"/>
+              <a:t>求</a:t>
+            </a:r>
+            <a:r>
+              <a:rPr lang="en-US" altLang="zh-CN" dirty="0" err="1"/>
+              <a:t>cj</a:t>
+            </a:r>
+            <a:r>
+              <a:rPr lang="zh-CN" altLang="en-US" dirty="0"/>
+              <a:t>。这里直接取</a:t>
+            </a:r>
+            <a:r>
+              <a:rPr lang="en-US" altLang="zh-CN" dirty="0"/>
+              <a:t>t</a:t>
+            </a:r>
+            <a:r>
+              <a:rPr lang="zh-CN" altLang="en-US" dirty="0"/>
+              <a:t>个子问题中</a:t>
+            </a:r>
+            <a:r>
+              <a:rPr lang="en-US" altLang="zh-CN" dirty="0" err="1"/>
+              <a:t>bj</a:t>
+            </a:r>
+            <a:r>
+              <a:rPr lang="zh-CN" altLang="en-US" dirty="0"/>
+              <a:t>的平均值就可以了。这两个步骤交替进行直到算法收敛。这样就得到随机稀疏子空间聚类的系数解，再求亲和矩阵进行谱聚类。</a:t>
             </a:r>
           </a:p>
         </p:txBody>
@@ -1445,7 +1608,7 @@
           <a:p>
             <a:r>
               <a:rPr lang="zh-CN" altLang="en-US" dirty="0"/>
-              <a:t>在进行下一步之前，我们先总结一下作者提出的模型和方法。</a:t>
+              <a:t>我们先总结一下作者提到的模型和方法。</a:t>
             </a:r>
             <a:endParaRPr lang="en-US" altLang="zh-CN" dirty="0"/>
           </a:p>
@@ -1553,7 +1716,10 @@
           <a:bodyPr/>
           <a:lstStyle/>
           <a:p>
-            <a:endParaRPr lang="zh-CN" altLang="en-US" dirty="0"/>
+            <a:r>
+              <a:rPr lang="zh-CN" altLang="en-US" dirty="0"/>
+              <a:t>接下来是展示模型的实验结果。 </a:t>
+            </a:r>
           </a:p>
         </p:txBody>
       </p:sp>
@@ -1924,8 +2090,8 @@
               <a:t>和</a:t>
             </a:r>
             <a:r>
-              <a:rPr lang="en-US" altLang="zh-CN" dirty="0" err="1"/>
-              <a:t>kesi</a:t>
+              <a:rPr lang="en-US" altLang="zh-CN" dirty="0"/>
+              <a:t>T</a:t>
             </a:r>
             <a:r>
               <a:rPr lang="zh-CN" altLang="en-US" dirty="0"/>
@@ -2117,7 +2283,7 @@
           <a:p>
             <a:r>
               <a:rPr lang="zh-CN" altLang="en-US" dirty="0"/>
-              <a:t>我要介绍的内容主要分为两部分，第一部分是论文的内容，第二部分是我在阅读论文中过程中学到了什么、有什么疑问</a:t>
+              <a:t>我要分享的内容主要分为这几个部分。简单的介绍子空间聚类和相关的工作，引出这篇论文做的工作和相关实验。最后是我在阅读论文的过程中学到了什么以及一些疑问。</a:t>
             </a:r>
           </a:p>
         </p:txBody>
@@ -2401,7 +2567,7 @@
           <a:p>
             <a:r>
               <a:rPr lang="zh-CN" altLang="en-US" dirty="0"/>
-              <a:t>因为我在阅读这篇论文的时候是没有任何子空间聚类知识基础的，所以理解这篇论文的时候查阅了很多相关的知识点。可能一些显而易见的的术语，我是从来没见过的。</a:t>
+              <a:t>因为我在阅读这篇论文的时候是没有任何子空间聚类知识基础的，可能一些显而易见的的术语，我是从来没见过的，所以理解这篇论文的时候查阅了很多相关的知识点。</a:t>
             </a:r>
             <a:endParaRPr lang="en-US" altLang="zh-CN" dirty="0"/>
           </a:p>
@@ -2590,7 +2756,7 @@
           <a:p>
             <a:r>
               <a:rPr lang="zh-CN" altLang="en-US" dirty="0"/>
-              <a:t>如果我想进一步深度理解子空间聚类的话，那么下一步我要做这些东西。</a:t>
+              <a:t>我在阅读这篇论文中学到了很多相关的知识，但主要都是从概念和理论上的理解，没有动手操作。如果我想进一步深度理解子空间聚类的话，那么下一步我要做这些东西。</a:t>
             </a:r>
           </a:p>
         </p:txBody>
@@ -2772,7 +2938,7 @@
           <a:p>
             <a:r>
               <a:rPr lang="zh-CN" altLang="en-US" dirty="0"/>
-              <a:t>高维数据可以近似的表示成多个低维子空间的并集，而每个子空间对应着一个类别。</a:t>
+              <a:t>现实生活中很多数据都是高维数据，可以近似的表示成多个低维子空间的并集，而每个子空间对应着一个类别。</a:t>
             </a:r>
             <a:endParaRPr lang="en-US" altLang="zh-CN" dirty="0"/>
           </a:p>
@@ -2801,7 +2967,7 @@
           <a:p>
             <a:r>
               <a:rPr lang="zh-CN" altLang="en-US" dirty="0"/>
-              <a:t>在现实世界中，子空间聚类已经有了很多的应用。比如运动物体分割、人脸图像聚类、手写数字聚类、遥感影像的聚类</a:t>
+              <a:t>目前子空间聚类已经有了很多的应用。比如运动物体分割、人脸图像聚类、手写数字聚类、遥感影像的聚类</a:t>
             </a:r>
           </a:p>
         </p:txBody>
@@ -2886,7 +3052,10 @@
           <a:bodyPr/>
           <a:lstStyle/>
           <a:p>
-            <a:endParaRPr lang="zh-CN" altLang="en-US" dirty="0"/>
+            <a:r>
+              <a:rPr lang="zh-CN" altLang="en-US" dirty="0"/>
+              <a:t>接下来简单的介绍一下在子空间聚类方面的相关工作。</a:t>
+            </a:r>
           </a:p>
         </p:txBody>
       </p:sp>
@@ -2980,7 +3149,7 @@
             </a:r>
             <a:r>
               <a:rPr lang="zh-CN" altLang="en-US" dirty="0"/>
-              <a:t>子空间聚类，它通过参数化子空间的基，最小化数据点到相应空间的距离来进行分割。但是这种方法局限性比较大，</a:t>
+              <a:t>子空间聚类，它通过参数化子空间的基，最小化数据点到相应子空间的距离来进行分割。但是这种方法局限性比较大，</a:t>
             </a:r>
             <a:r>
               <a:rPr lang="en-US" altLang="zh-CN" dirty="0"/>
@@ -3295,7 +3464,7 @@
             </a:r>
             <a:r>
               <a:rPr lang="zh-CN" altLang="en-US" dirty="0"/>
-              <a:t>范数来实现的。在数据点中有缺失值、噪声的情况下，</a:t>
+              <a:t>范数来实现的。即使在数据点中缺失值、噪声的情况下，</a:t>
             </a:r>
             <a:r>
               <a:rPr lang="en-US" altLang="zh-CN" dirty="0"/>
@@ -3303,7 +3472,22 @@
             </a:r>
             <a:r>
               <a:rPr lang="zh-CN" altLang="en-US" dirty="0"/>
-              <a:t>也能保证得到子空间保持的解。可以说</a:t>
+              <a:t>也能保证得到子空间保持的解。</a:t>
+            </a:r>
+            <a:endParaRPr lang="en-US" altLang="zh-CN" dirty="0"/>
+          </a:p>
+          <a:p>
+            <a:r>
+              <a:rPr lang="zh-CN" altLang="en-US" dirty="0"/>
+              <a:t>但是一个好的亲和矩阵仅有子空间保持性质是不够的。子空间保持性质的解只能保证来自不同子空间的数据点不相连，但不保证同一个子空间的数据点形成单个连同分量。这就是连通性问题</a:t>
+            </a:r>
+            <a:r>
+              <a:rPr lang="en-US" altLang="zh-CN" dirty="0"/>
+              <a:t>,</a:t>
+            </a:r>
+            <a:r>
+              <a:rPr lang="zh-CN" altLang="en-US" dirty="0"/>
+              <a:t>这会导致谱聚类出现过分割。</a:t>
             </a:r>
             <a:r>
               <a:rPr lang="en-US" altLang="zh-CN" dirty="0"/>
@@ -3311,22 +3495,22 @@
             </a:r>
             <a:r>
               <a:rPr lang="zh-CN" altLang="en-US" dirty="0"/>
-              <a:t>在求解具有子空间保持性质的解方面已经做的非常好了。</a:t>
+              <a:t>的缺点就是当子空间的维数超过</a:t>
+            </a:r>
+            <a:r>
+              <a:rPr lang="en-US" altLang="zh-CN" dirty="0"/>
+              <a:t>3</a:t>
+            </a:r>
+            <a:r>
+              <a:rPr lang="zh-CN" altLang="en-US" dirty="0"/>
+              <a:t>时，会出现连通性问题。</a:t>
             </a:r>
             <a:endParaRPr lang="en-US" altLang="zh-CN" dirty="0"/>
           </a:p>
           <a:p>
             <a:r>
               <a:rPr lang="zh-CN" altLang="en-US" dirty="0"/>
-              <a:t>但是一个好的亲和矩阵仅有子空间保持性质是不够的。子空间保持性质的解只能保证来自不同子空间的数据点不相连，但不保证同一个子空间的数据点形成单个连同分量。这就是连通性问题</a:t>
-            </a:r>
-            <a:r>
-              <a:rPr lang="en-US" altLang="zh-CN" dirty="0"/>
-              <a:t>,</a:t>
-            </a:r>
-            <a:r>
-              <a:rPr lang="zh-CN" altLang="en-US" dirty="0"/>
-              <a:t>这会导致谱聚类出现过分割。</a:t>
+              <a:t>总结一下，一个好的亲和矩阵既要有子空间保持性质，又要有较好的连通性。</a:t>
             </a:r>
             <a:r>
               <a:rPr lang="en-US" altLang="zh-CN" dirty="0"/>
@@ -3334,22 +3518,14 @@
             </a:r>
             <a:r>
               <a:rPr lang="zh-CN" altLang="en-US" dirty="0"/>
-              <a:t>的缺点就是当子空间的维数超过</a:t>
-            </a:r>
-            <a:r>
-              <a:rPr lang="en-US" altLang="zh-CN" dirty="0"/>
-              <a:t>3</a:t>
-            </a:r>
+              <a:t>在子空间保持性质上做的很好，但是存在连通性问题。</a:t>
+            </a:r>
+            <a:endParaRPr lang="en-US" altLang="zh-CN" dirty="0"/>
+          </a:p>
+          <a:p>
             <a:r>
               <a:rPr lang="zh-CN" altLang="en-US" dirty="0"/>
-              <a:t>时，会出现连通性问题。</a:t>
-            </a:r>
-            <a:endParaRPr lang="en-US" altLang="zh-CN" dirty="0"/>
-          </a:p>
-          <a:p>
-            <a:r>
-              <a:rPr lang="zh-CN" altLang="en-US" dirty="0"/>
-              <a:t>总结一下，一个好的亲和矩阵既要有子空间保持性质，又要有较好的连通性。</a:t>
+              <a:t>已经有一些研究尝试解决</a:t>
             </a:r>
             <a:r>
               <a:rPr lang="en-US" altLang="zh-CN" dirty="0"/>
@@ -3357,14 +3533,14 @@
             </a:r>
             <a:r>
               <a:rPr lang="zh-CN" altLang="en-US" dirty="0"/>
-              <a:t>在子空间保持性质上做的很好，但是存在连通性问题。</a:t>
+              <a:t>中的连通性问题，但是它们要么无法用于大规模数据集上要么只在特定条件下才有效。</a:t>
             </a:r>
             <a:endParaRPr lang="en-US" altLang="zh-CN" dirty="0"/>
           </a:p>
           <a:p>
             <a:r>
               <a:rPr lang="zh-CN" altLang="en-US" dirty="0"/>
-              <a:t>已经有一些研究尝试解决</a:t>
+              <a:t>所以这篇论文就是想在</a:t>
             </a:r>
             <a:r>
               <a:rPr lang="en-US" altLang="zh-CN" dirty="0"/>
@@ -3372,14 +3548,7 @@
             </a:r>
             <a:r>
               <a:rPr lang="zh-CN" altLang="en-US" dirty="0"/>
-              <a:t>中的连通性问题，但是它们无法用于大规模数据计算要么只在特定条件下才有效。</a:t>
-            </a:r>
-            <a:endParaRPr lang="en-US" altLang="zh-CN" dirty="0"/>
-          </a:p>
-          <a:p>
-            <a:r>
-              <a:rPr lang="zh-CN" altLang="en-US" dirty="0"/>
-              <a:t>所以这篇论文就是想提出一个子空间聚类方法，既能改善连通性，又能用在大规模数据集上。</a:t>
+              <a:t>上提出一个子空间聚类方法，既能改善连通性，又能用在大规模数据集上。</a:t>
             </a:r>
             <a:endParaRPr lang="en-US" altLang="zh-CN" dirty="0"/>
           </a:p>
@@ -3468,7 +3637,10 @@
           <a:bodyPr/>
           <a:lstStyle/>
           <a:p>
-            <a:endParaRPr lang="zh-CN" altLang="en-US" dirty="0"/>
+            <a:r>
+              <a:rPr lang="zh-CN" altLang="en-US" dirty="0"/>
+              <a:t>接下来是分享这篇论文如何解决这些问题的。</a:t>
+            </a:r>
           </a:p>
         </p:txBody>
       </p:sp>
@@ -3786,7 +3958,7 @@
           <a:p>
             <a:fld id="{6EAEEC6F-A6DD-4DA3-BD58-B36E19208FB6}" type="datetimeFigureOut">
               <a:rPr lang="zh-CN" altLang="en-US" smtClean="0"/>
-              <a:t>2021/7/18</a:t>
+              <a:t>2021/7/21</a:t>
             </a:fld>
             <a:endParaRPr lang="zh-CN" altLang="en-US"/>
           </a:p>
@@ -3984,7 +4156,7 @@
           <a:p>
             <a:fld id="{6EAEEC6F-A6DD-4DA3-BD58-B36E19208FB6}" type="datetimeFigureOut">
               <a:rPr lang="zh-CN" altLang="en-US" smtClean="0"/>
-              <a:t>2021/7/18</a:t>
+              <a:t>2021/7/21</a:t>
             </a:fld>
             <a:endParaRPr lang="zh-CN" altLang="en-US"/>
           </a:p>
@@ -4192,7 +4364,7 @@
           <a:p>
             <a:fld id="{6EAEEC6F-A6DD-4DA3-BD58-B36E19208FB6}" type="datetimeFigureOut">
               <a:rPr lang="zh-CN" altLang="en-US" smtClean="0"/>
-              <a:t>2021/7/18</a:t>
+              <a:t>2021/7/21</a:t>
             </a:fld>
             <a:endParaRPr lang="zh-CN" altLang="en-US"/>
           </a:p>
@@ -4390,7 +4562,7 @@
           <a:p>
             <a:fld id="{6EAEEC6F-A6DD-4DA3-BD58-B36E19208FB6}" type="datetimeFigureOut">
               <a:rPr lang="zh-CN" altLang="en-US" smtClean="0"/>
-              <a:t>2021/7/18</a:t>
+              <a:t>2021/7/21</a:t>
             </a:fld>
             <a:endParaRPr lang="zh-CN" altLang="en-US"/>
           </a:p>
@@ -4665,7 +4837,7 @@
           <a:p>
             <a:fld id="{6EAEEC6F-A6DD-4DA3-BD58-B36E19208FB6}" type="datetimeFigureOut">
               <a:rPr lang="zh-CN" altLang="en-US" smtClean="0"/>
-              <a:t>2021/7/18</a:t>
+              <a:t>2021/7/21</a:t>
             </a:fld>
             <a:endParaRPr lang="zh-CN" altLang="en-US"/>
           </a:p>
@@ -4930,7 +5102,7 @@
           <a:p>
             <a:fld id="{6EAEEC6F-A6DD-4DA3-BD58-B36E19208FB6}" type="datetimeFigureOut">
               <a:rPr lang="zh-CN" altLang="en-US" smtClean="0"/>
-              <a:t>2021/7/18</a:t>
+              <a:t>2021/7/21</a:t>
             </a:fld>
             <a:endParaRPr lang="zh-CN" altLang="en-US"/>
           </a:p>
@@ -5342,7 +5514,7 @@
           <a:p>
             <a:fld id="{6EAEEC6F-A6DD-4DA3-BD58-B36E19208FB6}" type="datetimeFigureOut">
               <a:rPr lang="zh-CN" altLang="en-US" smtClean="0"/>
-              <a:t>2021/7/18</a:t>
+              <a:t>2021/7/21</a:t>
             </a:fld>
             <a:endParaRPr lang="zh-CN" altLang="en-US"/>
           </a:p>
@@ -5483,7 +5655,7 @@
           <a:p>
             <a:fld id="{6EAEEC6F-A6DD-4DA3-BD58-B36E19208FB6}" type="datetimeFigureOut">
               <a:rPr lang="zh-CN" altLang="en-US" smtClean="0"/>
-              <a:t>2021/7/18</a:t>
+              <a:t>2021/7/21</a:t>
             </a:fld>
             <a:endParaRPr lang="zh-CN" altLang="en-US"/>
           </a:p>
@@ -5596,7 +5768,7 @@
           <a:p>
             <a:fld id="{6EAEEC6F-A6DD-4DA3-BD58-B36E19208FB6}" type="datetimeFigureOut">
               <a:rPr lang="zh-CN" altLang="en-US" smtClean="0"/>
-              <a:t>2021/7/18</a:t>
+              <a:t>2021/7/21</a:t>
             </a:fld>
             <a:endParaRPr lang="zh-CN" altLang="en-US"/>
           </a:p>
@@ -5907,7 +6079,7 @@
           <a:p>
             <a:fld id="{6EAEEC6F-A6DD-4DA3-BD58-B36E19208FB6}" type="datetimeFigureOut">
               <a:rPr lang="zh-CN" altLang="en-US" smtClean="0"/>
-              <a:t>2021/7/18</a:t>
+              <a:t>2021/7/21</a:t>
             </a:fld>
             <a:endParaRPr lang="zh-CN" altLang="en-US"/>
           </a:p>
@@ -6195,7 +6367,7 @@
           <a:p>
             <a:fld id="{6EAEEC6F-A6DD-4DA3-BD58-B36E19208FB6}" type="datetimeFigureOut">
               <a:rPr lang="zh-CN" altLang="en-US" smtClean="0"/>
-              <a:t>2021/7/18</a:t>
+              <a:t>2021/7/21</a:t>
             </a:fld>
             <a:endParaRPr lang="zh-CN" altLang="en-US"/>
           </a:p>
@@ -6436,7 +6608,7 @@
           <a:p>
             <a:fld id="{6EAEEC6F-A6DD-4DA3-BD58-B36E19208FB6}" type="datetimeFigureOut">
               <a:rPr lang="zh-CN" altLang="en-US" smtClean="0"/>
-              <a:t>2021/7/18</a:t>
+              <a:t>2021/7/21</a:t>
             </a:fld>
             <a:endParaRPr lang="zh-CN" altLang="en-US"/>
           </a:p>
@@ -7329,8 +7501,8 @@
         </p:nvSpPr>
         <p:spPr>
           <a:xfrm>
-            <a:off x="7813468" y="5485339"/>
-            <a:ext cx="2162772" cy="338554"/>
+            <a:off x="7179623" y="5439858"/>
+            <a:ext cx="3047629" cy="338554"/>
           </a:xfrm>
           <a:prstGeom prst="rect">
             <a:avLst/>
@@ -7362,7 +7534,7 @@
                 <a:latin typeface="Times New Roman" panose="02020603050405020304" pitchFamily="18" charset="0"/>
                 <a:cs typeface="Times New Roman" panose="02020603050405020304" pitchFamily="18" charset="0"/>
               </a:rPr>
-              <a:t> Zeng</a:t>
+              <a:t> Zeng 2021/7/19</a:t>
             </a:r>
             <a:endParaRPr lang="zh-CN" altLang="en-US" sz="1600" dirty="0">
               <a:latin typeface="Times New Roman" panose="02020603050405020304" pitchFamily="18" charset="0"/>
@@ -7785,6 +7957,9 @@
                     <p:cTn id="3" fill="hold">
                       <p:stCondLst>
                         <p:cond delay="indefinite"/>
+                        <p:cond evt="onBegin" delay="0">
+                          <p:tn val="2"/>
+                        </p:cond>
                       </p:stCondLst>
                       <p:childTnLst>
                         <p:par>
@@ -7794,7 +7969,7 @@
                             </p:stCondLst>
                             <p:childTnLst>
                               <p:par>
-                                <p:cTn id="5" presetID="10" presetClass="entr" presetSubtype="0" fill="hold" grpId="0" nodeType="clickEffect">
+                                <p:cTn id="5" presetID="10" presetClass="entr" presetSubtype="0" fill="hold" grpId="0" nodeType="withEffect">
                                   <p:stCondLst>
                                     <p:cond delay="0"/>
                                   </p:stCondLst>
@@ -7802,137 +7977,6 @@
                                     <p:set>
                                       <p:cBhvr>
                                         <p:cTn id="6" dur="1" fill="hold">
-                                          <p:stCondLst>
-                                            <p:cond delay="0"/>
-                                          </p:stCondLst>
-                                        </p:cTn>
-                                        <p:tgtEl>
-                                          <p:spTgt spid="16"/>
-                                        </p:tgtEl>
-                                        <p:attrNameLst>
-                                          <p:attrName>style.visibility</p:attrName>
-                                        </p:attrNameLst>
-                                      </p:cBhvr>
-                                      <p:to>
-                                        <p:strVal val="visible"/>
-                                      </p:to>
-                                    </p:set>
-                                    <p:animEffect transition="in" filter="fade">
-                                      <p:cBhvr>
-                                        <p:cTn id="7" dur="500"/>
-                                        <p:tgtEl>
-                                          <p:spTgt spid="16"/>
-                                        </p:tgtEl>
-                                      </p:cBhvr>
-                                    </p:animEffect>
-                                  </p:childTnLst>
-                                </p:cTn>
-                              </p:par>
-                              <p:par>
-                                <p:cTn id="8" presetID="10" presetClass="entr" presetSubtype="0" fill="hold" nodeType="withEffect">
-                                  <p:stCondLst>
-                                    <p:cond delay="0"/>
-                                  </p:stCondLst>
-                                  <p:childTnLst>
-                                    <p:set>
-                                      <p:cBhvr>
-                                        <p:cTn id="9" dur="1" fill="hold">
-                                          <p:stCondLst>
-                                            <p:cond delay="0"/>
-                                          </p:stCondLst>
-                                        </p:cTn>
-                                        <p:tgtEl>
-                                          <p:spTgt spid="7"/>
-                                        </p:tgtEl>
-                                        <p:attrNameLst>
-                                          <p:attrName>style.visibility</p:attrName>
-                                        </p:attrNameLst>
-                                      </p:cBhvr>
-                                      <p:to>
-                                        <p:strVal val="visible"/>
-                                      </p:to>
-                                    </p:set>
-                                    <p:animEffect transition="in" filter="fade">
-                                      <p:cBhvr>
-                                        <p:cTn id="10" dur="500"/>
-                                        <p:tgtEl>
-                                          <p:spTgt spid="7"/>
-                                        </p:tgtEl>
-                                      </p:cBhvr>
-                                    </p:animEffect>
-                                  </p:childTnLst>
-                                </p:cTn>
-                              </p:par>
-                            </p:childTnLst>
-                          </p:cTn>
-                        </p:par>
-                      </p:childTnLst>
-                    </p:cTn>
-                  </p:par>
-                  <p:par>
-                    <p:cTn id="11" fill="hold">
-                      <p:stCondLst>
-                        <p:cond delay="indefinite"/>
-                      </p:stCondLst>
-                      <p:childTnLst>
-                        <p:par>
-                          <p:cTn id="12" fill="hold">
-                            <p:stCondLst>
-                              <p:cond delay="0"/>
-                            </p:stCondLst>
-                            <p:childTnLst>
-                              <p:par>
-                                <p:cTn id="13" presetID="10" presetClass="entr" presetSubtype="0" fill="hold" grpId="0" nodeType="clickEffect">
-                                  <p:stCondLst>
-                                    <p:cond delay="0"/>
-                                  </p:stCondLst>
-                                  <p:childTnLst>
-                                    <p:set>
-                                      <p:cBhvr>
-                                        <p:cTn id="14" dur="1" fill="hold">
-                                          <p:stCondLst>
-                                            <p:cond delay="0"/>
-                                          </p:stCondLst>
-                                        </p:cTn>
-                                        <p:tgtEl>
-                                          <p:spTgt spid="3">
-                                            <p:txEl>
-                                              <p:pRg st="0" end="0"/>
-                                            </p:txEl>
-                                          </p:spTgt>
-                                        </p:tgtEl>
-                                        <p:attrNameLst>
-                                          <p:attrName>style.visibility</p:attrName>
-                                        </p:attrNameLst>
-                                      </p:cBhvr>
-                                      <p:to>
-                                        <p:strVal val="visible"/>
-                                      </p:to>
-                                    </p:set>
-                                    <p:animEffect transition="in" filter="fade">
-                                      <p:cBhvr>
-                                        <p:cTn id="15" dur="500"/>
-                                        <p:tgtEl>
-                                          <p:spTgt spid="3">
-                                            <p:txEl>
-                                              <p:pRg st="0" end="0"/>
-                                            </p:txEl>
-                                          </p:spTgt>
-                                        </p:tgtEl>
-                                      </p:cBhvr>
-                                    </p:animEffect>
-                                  </p:childTnLst>
-                                </p:cTn>
-                              </p:par>
-                              <p:par>
-                                <p:cTn id="16" presetID="10" presetClass="entr" presetSubtype="0" fill="hold" grpId="0" nodeType="withEffect">
-                                  <p:stCondLst>
-                                    <p:cond delay="0"/>
-                                  </p:stCondLst>
-                                  <p:childTnLst>
-                                    <p:set>
-                                      <p:cBhvr>
-                                        <p:cTn id="17" dur="1" fill="hold">
                                           <p:stCondLst>
                                             <p:cond delay="0"/>
                                           </p:stCondLst>
@@ -7954,13 +7998,136 @@
                                     </p:set>
                                     <p:animEffect transition="in" filter="fade">
                                       <p:cBhvr>
-                                        <p:cTn id="18" dur="500"/>
+                                        <p:cTn id="7" dur="500"/>
                                         <p:tgtEl>
                                           <p:spTgt spid="3">
                                             <p:txEl>
                                               <p:pRg st="1" end="1"/>
                                             </p:txEl>
                                           </p:spTgt>
+                                        </p:tgtEl>
+                                      </p:cBhvr>
+                                    </p:animEffect>
+                                  </p:childTnLst>
+                                </p:cTn>
+                              </p:par>
+                              <p:par>
+                                <p:cTn id="8" presetID="10" presetClass="entr" presetSubtype="0" fill="hold" nodeType="withEffect">
+                                  <p:stCondLst>
+                                    <p:cond delay="0"/>
+                                  </p:stCondLst>
+                                  <p:childTnLst>
+                                    <p:set>
+                                      <p:cBhvr>
+                                        <p:cTn id="9" dur="1" fill="hold">
+                                          <p:stCondLst>
+                                            <p:cond delay="0"/>
+                                          </p:stCondLst>
+                                        </p:cTn>
+                                        <p:tgtEl>
+                                          <p:spTgt spid="9"/>
+                                        </p:tgtEl>
+                                        <p:attrNameLst>
+                                          <p:attrName>style.visibility</p:attrName>
+                                        </p:attrNameLst>
+                                      </p:cBhvr>
+                                      <p:to>
+                                        <p:strVal val="visible"/>
+                                      </p:to>
+                                    </p:set>
+                                    <p:animEffect transition="in" filter="fade">
+                                      <p:cBhvr>
+                                        <p:cTn id="10" dur="500"/>
+                                        <p:tgtEl>
+                                          <p:spTgt spid="9"/>
+                                        </p:tgtEl>
+                                      </p:cBhvr>
+                                    </p:animEffect>
+                                  </p:childTnLst>
+                                </p:cTn>
+                              </p:par>
+                              <p:par>
+                                <p:cTn id="11" presetID="10" presetClass="entr" presetSubtype="0" fill="hold" nodeType="withEffect">
+                                  <p:stCondLst>
+                                    <p:cond delay="0"/>
+                                  </p:stCondLst>
+                                  <p:childTnLst>
+                                    <p:set>
+                                      <p:cBhvr>
+                                        <p:cTn id="12" dur="1" fill="hold">
+                                          <p:stCondLst>
+                                            <p:cond delay="0"/>
+                                          </p:stCondLst>
+                                        </p:cTn>
+                                        <p:tgtEl>
+                                          <p:spTgt spid="11"/>
+                                        </p:tgtEl>
+                                        <p:attrNameLst>
+                                          <p:attrName>style.visibility</p:attrName>
+                                        </p:attrNameLst>
+                                      </p:cBhvr>
+                                      <p:to>
+                                        <p:strVal val="visible"/>
+                                      </p:to>
+                                    </p:set>
+                                    <p:animEffect transition="in" filter="fade">
+                                      <p:cBhvr>
+                                        <p:cTn id="13" dur="500"/>
+                                        <p:tgtEl>
+                                          <p:spTgt spid="11"/>
+                                        </p:tgtEl>
+                                      </p:cBhvr>
+                                    </p:animEffect>
+                                  </p:childTnLst>
+                                </p:cTn>
+                              </p:par>
+                            </p:childTnLst>
+                          </p:cTn>
+                        </p:par>
+                      </p:childTnLst>
+                    </p:cTn>
+                  </p:par>
+                  <p:par>
+                    <p:cTn id="14" fill="hold">
+                      <p:stCondLst>
+                        <p:cond delay="indefinite"/>
+                      </p:stCondLst>
+                      <p:childTnLst>
+                        <p:par>
+                          <p:cTn id="15" fill="hold">
+                            <p:stCondLst>
+                              <p:cond delay="0"/>
+                            </p:stCondLst>
+                            <p:childTnLst>
+                              <p:par>
+                                <p:cTn id="16" presetID="10" presetClass="entr" presetSubtype="0" fill="hold" grpId="0" nodeType="clickEffect">
+                                  <p:stCondLst>
+                                    <p:cond delay="0"/>
+                                  </p:stCondLst>
+                                  <p:childTnLst>
+                                    <p:set>
+                                      <p:cBhvr>
+                                        <p:cTn id="17" dur="1" fill="hold">
+                                          <p:stCondLst>
+                                            <p:cond delay="0"/>
+                                          </p:stCondLst>
+                                        </p:cTn>
+                                        <p:tgtEl>
+                                          <p:spTgt spid="18"/>
+                                        </p:tgtEl>
+                                        <p:attrNameLst>
+                                          <p:attrName>style.visibility</p:attrName>
+                                        </p:attrNameLst>
+                                      </p:cBhvr>
+                                      <p:to>
+                                        <p:strVal val="visible"/>
+                                      </p:to>
+                                    </p:set>
+                                    <p:animEffect transition="in" filter="fade">
+                                      <p:cBhvr>
+                                        <p:cTn id="18" dur="500"/>
+                                        <p:tgtEl>
+                                          <p:spTgt spid="18"/>
                                         </p:tgtEl>
                                       </p:cBhvr>
                                     </p:animEffect>
@@ -7981,7 +8148,7 @@
                                           </p:stCondLst>
                                         </p:cTn>
                                         <p:tgtEl>
-                                          <p:spTgt spid="9"/>
+                                          <p:spTgt spid="13"/>
                                         </p:tgtEl>
                                         <p:attrNameLst>
                                           <p:attrName>style.visibility</p:attrName>
@@ -7994,129 +8161,6 @@
                                     <p:animEffect transition="in" filter="fade">
                                       <p:cBhvr>
                                         <p:cTn id="21" dur="500"/>
-                                        <p:tgtEl>
-                                          <p:spTgt spid="9"/>
-                                        </p:tgtEl>
-                                      </p:cBhvr>
-                                    </p:animEffect>
-                                  </p:childTnLst>
-                                </p:cTn>
-                              </p:par>
-                              <p:par>
-                                <p:cTn id="22" presetID="10" presetClass="entr" presetSubtype="0" fill="hold" nodeType="withEffect">
-                                  <p:stCondLst>
-                                    <p:cond delay="0"/>
-                                  </p:stCondLst>
-                                  <p:childTnLst>
-                                    <p:set>
-                                      <p:cBhvr>
-                                        <p:cTn id="23" dur="1" fill="hold">
-                                          <p:stCondLst>
-                                            <p:cond delay="0"/>
-                                          </p:stCondLst>
-                                        </p:cTn>
-                                        <p:tgtEl>
-                                          <p:spTgt spid="11"/>
-                                        </p:tgtEl>
-                                        <p:attrNameLst>
-                                          <p:attrName>style.visibility</p:attrName>
-                                        </p:attrNameLst>
-                                      </p:cBhvr>
-                                      <p:to>
-                                        <p:strVal val="visible"/>
-                                      </p:to>
-                                    </p:set>
-                                    <p:animEffect transition="in" filter="fade">
-                                      <p:cBhvr>
-                                        <p:cTn id="24" dur="500"/>
-                                        <p:tgtEl>
-                                          <p:spTgt spid="11"/>
-                                        </p:tgtEl>
-                                      </p:cBhvr>
-                                    </p:animEffect>
-                                  </p:childTnLst>
-                                </p:cTn>
-                              </p:par>
-                            </p:childTnLst>
-                          </p:cTn>
-                        </p:par>
-                      </p:childTnLst>
-                    </p:cTn>
-                  </p:par>
-                  <p:par>
-                    <p:cTn id="25" fill="hold">
-                      <p:stCondLst>
-                        <p:cond delay="indefinite"/>
-                      </p:stCondLst>
-                      <p:childTnLst>
-                        <p:par>
-                          <p:cTn id="26" fill="hold">
-                            <p:stCondLst>
-                              <p:cond delay="0"/>
-                            </p:stCondLst>
-                            <p:childTnLst>
-                              <p:par>
-                                <p:cTn id="27" presetID="10" presetClass="entr" presetSubtype="0" fill="hold" grpId="0" nodeType="clickEffect">
-                                  <p:stCondLst>
-                                    <p:cond delay="0"/>
-                                  </p:stCondLst>
-                                  <p:childTnLst>
-                                    <p:set>
-                                      <p:cBhvr>
-                                        <p:cTn id="28" dur="1" fill="hold">
-                                          <p:stCondLst>
-                                            <p:cond delay="0"/>
-                                          </p:stCondLst>
-                                        </p:cTn>
-                                        <p:tgtEl>
-                                          <p:spTgt spid="18"/>
-                                        </p:tgtEl>
-                                        <p:attrNameLst>
-                                          <p:attrName>style.visibility</p:attrName>
-                                        </p:attrNameLst>
-                                      </p:cBhvr>
-                                      <p:to>
-                                        <p:strVal val="visible"/>
-                                      </p:to>
-                                    </p:set>
-                                    <p:animEffect transition="in" filter="fade">
-                                      <p:cBhvr>
-                                        <p:cTn id="29" dur="500"/>
-                                        <p:tgtEl>
-                                          <p:spTgt spid="18"/>
-                                        </p:tgtEl>
-                                      </p:cBhvr>
-                                    </p:animEffect>
-                                  </p:childTnLst>
-                                </p:cTn>
-                              </p:par>
-                              <p:par>
-                                <p:cTn id="30" presetID="10" presetClass="entr" presetSubtype="0" fill="hold" nodeType="withEffect">
-                                  <p:stCondLst>
-                                    <p:cond delay="0"/>
-                                  </p:stCondLst>
-                                  <p:childTnLst>
-                                    <p:set>
-                                      <p:cBhvr>
-                                        <p:cTn id="31" dur="1" fill="hold">
-                                          <p:stCondLst>
-                                            <p:cond delay="0"/>
-                                          </p:stCondLst>
-                                        </p:cTn>
-                                        <p:tgtEl>
-                                          <p:spTgt spid="13"/>
-                                        </p:tgtEl>
-                                        <p:attrNameLst>
-                                          <p:attrName>style.visibility</p:attrName>
-                                        </p:attrNameLst>
-                                      </p:cBhvr>
-                                      <p:to>
-                                        <p:strVal val="visible"/>
-                                      </p:to>
-                                    </p:set>
-                                    <p:animEffect transition="in" filter="fade">
-                                      <p:cBhvr>
-                                        <p:cTn id="32" dur="500"/>
                                         <p:tgtEl>
                                           <p:spTgt spid="13"/>
                                         </p:tgtEl>
@@ -8153,8 +8197,7 @@
       </p:par>
     </p:tnLst>
     <p:bldLst>
-      <p:bldP spid="3" grpId="0" build="p"/>
-      <p:bldP spid="16" grpId="0"/>
+      <p:bldP spid="3" grpId="0" uiExpand="1" build="p"/>
       <p:bldP spid="18" grpId="0"/>
     </p:bldLst>
   </p:timing>
@@ -8962,11 +9005,7 @@
                                           </p:stCondLst>
                                         </p:cTn>
                                         <p:tgtEl>
-                                          <p:spTgt spid="3">
-                                            <p:txEl>
-                                              <p:pRg st="0" end="0"/>
-                                            </p:txEl>
-                                          </p:spTgt>
+                                          <p:spTgt spid="11"/>
                                         </p:tgtEl>
                                         <p:attrNameLst>
                                           <p:attrName>style.visibility</p:attrName>
@@ -8980,141 +9019,6 @@
                                       <p:cBhvr>
                                         <p:cTn id="7" dur="500"/>
                                         <p:tgtEl>
-                                          <p:spTgt spid="3">
-                                            <p:txEl>
-                                              <p:pRg st="0" end="0"/>
-                                            </p:txEl>
-                                          </p:spTgt>
-                                        </p:tgtEl>
-                                      </p:cBhvr>
-                                    </p:animEffect>
-                                  </p:childTnLst>
-                                </p:cTn>
-                              </p:par>
-                              <p:par>
-                                <p:cTn id="8" presetID="10" presetClass="entr" presetSubtype="0" fill="hold" grpId="0" nodeType="withEffect">
-                                  <p:stCondLst>
-                                    <p:cond delay="0"/>
-                                  </p:stCondLst>
-                                  <p:childTnLst>
-                                    <p:set>
-                                      <p:cBhvr>
-                                        <p:cTn id="9" dur="1" fill="hold">
-                                          <p:stCondLst>
-                                            <p:cond delay="0"/>
-                                          </p:stCondLst>
-                                        </p:cTn>
-                                        <p:tgtEl>
-                                          <p:spTgt spid="3">
-                                            <p:txEl>
-                                              <p:pRg st="1" end="1"/>
-                                            </p:txEl>
-                                          </p:spTgt>
-                                        </p:tgtEl>
-                                        <p:attrNameLst>
-                                          <p:attrName>style.visibility</p:attrName>
-                                        </p:attrNameLst>
-                                      </p:cBhvr>
-                                      <p:to>
-                                        <p:strVal val="visible"/>
-                                      </p:to>
-                                    </p:set>
-                                    <p:animEffect transition="in" filter="fade">
-                                      <p:cBhvr>
-                                        <p:cTn id="10" dur="500"/>
-                                        <p:tgtEl>
-                                          <p:spTgt spid="3">
-                                            <p:txEl>
-                                              <p:pRg st="1" end="1"/>
-                                            </p:txEl>
-                                          </p:spTgt>
-                                        </p:tgtEl>
-                                      </p:cBhvr>
-                                    </p:animEffect>
-                                  </p:childTnLst>
-                                </p:cTn>
-                              </p:par>
-                              <p:par>
-                                <p:cTn id="11" presetID="10" presetClass="entr" presetSubtype="0" fill="hold" nodeType="withEffect">
-                                  <p:stCondLst>
-                                    <p:cond delay="0"/>
-                                  </p:stCondLst>
-                                  <p:childTnLst>
-                                    <p:set>
-                                      <p:cBhvr>
-                                        <p:cTn id="12" dur="1" fill="hold">
-                                          <p:stCondLst>
-                                            <p:cond delay="0"/>
-                                          </p:stCondLst>
-                                        </p:cTn>
-                                        <p:tgtEl>
-                                          <p:spTgt spid="4"/>
-                                        </p:tgtEl>
-                                        <p:attrNameLst>
-                                          <p:attrName>style.visibility</p:attrName>
-                                        </p:attrNameLst>
-                                      </p:cBhvr>
-                                      <p:to>
-                                        <p:strVal val="visible"/>
-                                      </p:to>
-                                    </p:set>
-                                    <p:animEffect transition="in" filter="fade">
-                                      <p:cBhvr>
-                                        <p:cTn id="13" dur="500"/>
-                                        <p:tgtEl>
-                                          <p:spTgt spid="4"/>
-                                        </p:tgtEl>
-                                      </p:cBhvr>
-                                    </p:animEffect>
-                                  </p:childTnLst>
-                                </p:cTn>
-                              </p:par>
-                            </p:childTnLst>
-                          </p:cTn>
-                        </p:par>
-                      </p:childTnLst>
-                    </p:cTn>
-                  </p:par>
-                  <p:par>
-                    <p:cTn id="14" fill="hold">
-                      <p:stCondLst>
-                        <p:cond delay="indefinite"/>
-                      </p:stCondLst>
-                      <p:childTnLst>
-                        <p:par>
-                          <p:cTn id="15" fill="hold">
-                            <p:stCondLst>
-                              <p:cond delay="0"/>
-                            </p:stCondLst>
-                            <p:childTnLst>
-                              <p:par>
-                                <p:cTn id="16" presetID="10" presetClass="entr" presetSubtype="0" fill="hold" grpId="0" nodeType="clickEffect">
-                                  <p:stCondLst>
-                                    <p:cond delay="0"/>
-                                  </p:stCondLst>
-                                  <p:childTnLst>
-                                    <p:set>
-                                      <p:cBhvr>
-                                        <p:cTn id="17" dur="1" fill="hold">
-                                          <p:stCondLst>
-                                            <p:cond delay="0"/>
-                                          </p:stCondLst>
-                                        </p:cTn>
-                                        <p:tgtEl>
-                                          <p:spTgt spid="11"/>
-                                        </p:tgtEl>
-                                        <p:attrNameLst>
-                                          <p:attrName>style.visibility</p:attrName>
-                                        </p:attrNameLst>
-                                      </p:cBhvr>
-                                      <p:to>
-                                        <p:strVal val="visible"/>
-                                      </p:to>
-                                    </p:set>
-                                    <p:animEffect transition="in" filter="fade">
-                                      <p:cBhvr>
-                                        <p:cTn id="18" dur="500"/>
-                                        <p:tgtEl>
                                           <p:spTgt spid="11"/>
                                         </p:tgtEl>
                                       </p:cBhvr>
@@ -9123,14 +9027,14 @@
                                 </p:cTn>
                               </p:par>
                               <p:par>
-                                <p:cTn id="19" presetID="10" presetClass="entr" presetSubtype="0" fill="hold" nodeType="withEffect">
+                                <p:cTn id="8" presetID="10" presetClass="entr" presetSubtype="0" fill="hold" nodeType="withEffect">
                                   <p:stCondLst>
                                     <p:cond delay="0"/>
                                   </p:stCondLst>
                                   <p:childTnLst>
                                     <p:set>
                                       <p:cBhvr>
-                                        <p:cTn id="20" dur="1" fill="hold">
+                                        <p:cTn id="9" dur="1" fill="hold">
                                           <p:stCondLst>
                                             <p:cond delay="0"/>
                                           </p:stCondLst>
@@ -9148,7 +9052,7 @@
                                     </p:set>
                                     <p:animEffect transition="in" filter="fade">
                                       <p:cBhvr>
-                                        <p:cTn id="21" dur="500"/>
+                                        <p:cTn id="10" dur="500"/>
                                         <p:tgtEl>
                                           <p:spTgt spid="15"/>
                                         </p:tgtEl>
@@ -9164,26 +9068,26 @@
                     </p:cTn>
                   </p:par>
                   <p:par>
-                    <p:cTn id="22" fill="hold">
+                    <p:cTn id="11" fill="hold">
                       <p:stCondLst>
                         <p:cond delay="indefinite"/>
                       </p:stCondLst>
                       <p:childTnLst>
                         <p:par>
-                          <p:cTn id="23" fill="hold">
+                          <p:cTn id="12" fill="hold">
                             <p:stCondLst>
                               <p:cond delay="0"/>
                             </p:stCondLst>
                             <p:childTnLst>
                               <p:par>
-                                <p:cTn id="24" presetID="10" presetClass="entr" presetSubtype="0" fill="hold" nodeType="clickEffect">
+                                <p:cTn id="13" presetID="10" presetClass="entr" presetSubtype="0" fill="hold" nodeType="clickEffect">
                                   <p:stCondLst>
                                     <p:cond delay="0"/>
                                   </p:stCondLst>
                                   <p:childTnLst>
                                     <p:set>
                                       <p:cBhvr>
-                                        <p:cTn id="25" dur="1" fill="hold">
+                                        <p:cTn id="14" dur="1" fill="hold">
                                           <p:stCondLst>
                                             <p:cond delay="0"/>
                                           </p:stCondLst>
@@ -9201,9 +9105,132 @@
                                     </p:set>
                                     <p:animEffect transition="in" filter="fade">
                                       <p:cBhvr>
+                                        <p:cTn id="15" dur="500"/>
+                                        <p:tgtEl>
+                                          <p:spTgt spid="17"/>
+                                        </p:tgtEl>
+                                      </p:cBhvr>
+                                    </p:animEffect>
+                                  </p:childTnLst>
+                                </p:cTn>
+                              </p:par>
+                            </p:childTnLst>
+                          </p:cTn>
+                        </p:par>
+                      </p:childTnLst>
+                    </p:cTn>
+                  </p:par>
+                  <p:par>
+                    <p:cTn id="16" fill="hold">
+                      <p:stCondLst>
+                        <p:cond delay="indefinite"/>
+                      </p:stCondLst>
+                      <p:childTnLst>
+                        <p:par>
+                          <p:cTn id="17" fill="hold">
+                            <p:stCondLst>
+                              <p:cond delay="0"/>
+                            </p:stCondLst>
+                            <p:childTnLst>
+                              <p:par>
+                                <p:cTn id="18" presetID="10" presetClass="entr" presetSubtype="0" fill="hold" grpId="0" nodeType="clickEffect">
+                                  <p:stCondLst>
+                                    <p:cond delay="0"/>
+                                  </p:stCondLst>
+                                  <p:childTnLst>
+                                    <p:set>
+                                      <p:cBhvr>
+                                        <p:cTn id="19" dur="1" fill="hold">
+                                          <p:stCondLst>
+                                            <p:cond delay="0"/>
+                                          </p:stCondLst>
+                                        </p:cTn>
+                                        <p:tgtEl>
+                                          <p:spTgt spid="9"/>
+                                        </p:tgtEl>
+                                        <p:attrNameLst>
+                                          <p:attrName>style.visibility</p:attrName>
+                                        </p:attrNameLst>
+                                      </p:cBhvr>
+                                      <p:to>
+                                        <p:strVal val="visible"/>
+                                      </p:to>
+                                    </p:set>
+                                    <p:animEffect transition="in" filter="fade">
+                                      <p:cBhvr>
+                                        <p:cTn id="20" dur="500"/>
+                                        <p:tgtEl>
+                                          <p:spTgt spid="9"/>
+                                        </p:tgtEl>
+                                      </p:cBhvr>
+                                    </p:animEffect>
+                                  </p:childTnLst>
+                                </p:cTn>
+                              </p:par>
+                              <p:par>
+                                <p:cTn id="21" presetID="10" presetClass="entr" presetSubtype="0" fill="hold" nodeType="withEffect">
+                                  <p:stCondLst>
+                                    <p:cond delay="0"/>
+                                  </p:stCondLst>
+                                  <p:childTnLst>
+                                    <p:set>
+                                      <p:cBhvr>
+                                        <p:cTn id="22" dur="1" fill="hold">
+                                          <p:stCondLst>
+                                            <p:cond delay="0"/>
+                                          </p:stCondLst>
+                                        </p:cTn>
+                                        <p:tgtEl>
+                                          <p:spTgt spid="8"/>
+                                        </p:tgtEl>
+                                        <p:attrNameLst>
+                                          <p:attrName>style.visibility</p:attrName>
+                                        </p:attrNameLst>
+                                      </p:cBhvr>
+                                      <p:to>
+                                        <p:strVal val="visible"/>
+                                      </p:to>
+                                    </p:set>
+                                    <p:animEffect transition="in" filter="fade">
+                                      <p:cBhvr>
+                                        <p:cTn id="23" dur="500"/>
+                                        <p:tgtEl>
+                                          <p:spTgt spid="8"/>
+                                        </p:tgtEl>
+                                      </p:cBhvr>
+                                    </p:animEffect>
+                                  </p:childTnLst>
+                                </p:cTn>
+                              </p:par>
+                              <p:par>
+                                <p:cTn id="24" presetID="10" presetClass="entr" presetSubtype="0" fill="hold" grpId="0" nodeType="withEffect">
+                                  <p:stCondLst>
+                                    <p:cond delay="0"/>
+                                  </p:stCondLst>
+                                  <p:childTnLst>
+                                    <p:set>
+                                      <p:cBhvr>
+                                        <p:cTn id="25" dur="1" fill="hold">
+                                          <p:stCondLst>
+                                            <p:cond delay="0"/>
+                                          </p:stCondLst>
+                                        </p:cTn>
+                                        <p:tgtEl>
+                                          <p:spTgt spid="10"/>
+                                        </p:tgtEl>
+                                        <p:attrNameLst>
+                                          <p:attrName>style.visibility</p:attrName>
+                                        </p:attrNameLst>
+                                      </p:cBhvr>
+                                      <p:to>
+                                        <p:strVal val="visible"/>
+                                      </p:to>
+                                    </p:set>
+                                    <p:animEffect transition="in" filter="fade">
+                                      <p:cBhvr>
                                         <p:cTn id="26" dur="500"/>
                                         <p:tgtEl>
-                                          <p:spTgt spid="17"/>
+                                          <p:spTgt spid="10"/>
                                         </p:tgtEl>
                                       </p:cBhvr>
                                     </p:animEffect>
@@ -9242,7 +9269,7 @@
                                           </p:stCondLst>
                                         </p:cTn>
                                         <p:tgtEl>
-                                          <p:spTgt spid="9"/>
+                                          <p:spTgt spid="13"/>
                                         </p:tgtEl>
                                         <p:attrNameLst>
                                           <p:attrName>style.visibility</p:attrName>
@@ -9255,129 +9282,6 @@
                                     <p:animEffect transition="in" filter="fade">
                                       <p:cBhvr>
                                         <p:cTn id="31" dur="500"/>
-                                        <p:tgtEl>
-                                          <p:spTgt spid="9"/>
-                                        </p:tgtEl>
-                                      </p:cBhvr>
-                                    </p:animEffect>
-                                  </p:childTnLst>
-                                </p:cTn>
-                              </p:par>
-                              <p:par>
-                                <p:cTn id="32" presetID="10" presetClass="entr" presetSubtype="0" fill="hold" nodeType="withEffect">
-                                  <p:stCondLst>
-                                    <p:cond delay="0"/>
-                                  </p:stCondLst>
-                                  <p:childTnLst>
-                                    <p:set>
-                                      <p:cBhvr>
-                                        <p:cTn id="33" dur="1" fill="hold">
-                                          <p:stCondLst>
-                                            <p:cond delay="0"/>
-                                          </p:stCondLst>
-                                        </p:cTn>
-                                        <p:tgtEl>
-                                          <p:spTgt spid="8"/>
-                                        </p:tgtEl>
-                                        <p:attrNameLst>
-                                          <p:attrName>style.visibility</p:attrName>
-                                        </p:attrNameLst>
-                                      </p:cBhvr>
-                                      <p:to>
-                                        <p:strVal val="visible"/>
-                                      </p:to>
-                                    </p:set>
-                                    <p:animEffect transition="in" filter="fade">
-                                      <p:cBhvr>
-                                        <p:cTn id="34" dur="500"/>
-                                        <p:tgtEl>
-                                          <p:spTgt spid="8"/>
-                                        </p:tgtEl>
-                                      </p:cBhvr>
-                                    </p:animEffect>
-                                  </p:childTnLst>
-                                </p:cTn>
-                              </p:par>
-                              <p:par>
-                                <p:cTn id="35" presetID="10" presetClass="entr" presetSubtype="0" fill="hold" grpId="0" nodeType="withEffect">
-                                  <p:stCondLst>
-                                    <p:cond delay="0"/>
-                                  </p:stCondLst>
-                                  <p:childTnLst>
-                                    <p:set>
-                                      <p:cBhvr>
-                                        <p:cTn id="36" dur="1" fill="hold">
-                                          <p:stCondLst>
-                                            <p:cond delay="0"/>
-                                          </p:stCondLst>
-                                        </p:cTn>
-                                        <p:tgtEl>
-                                          <p:spTgt spid="10"/>
-                                        </p:tgtEl>
-                                        <p:attrNameLst>
-                                          <p:attrName>style.visibility</p:attrName>
-                                        </p:attrNameLst>
-                                      </p:cBhvr>
-                                      <p:to>
-                                        <p:strVal val="visible"/>
-                                      </p:to>
-                                    </p:set>
-                                    <p:animEffect transition="in" filter="fade">
-                                      <p:cBhvr>
-                                        <p:cTn id="37" dur="500"/>
-                                        <p:tgtEl>
-                                          <p:spTgt spid="10"/>
-                                        </p:tgtEl>
-                                      </p:cBhvr>
-                                    </p:animEffect>
-                                  </p:childTnLst>
-                                </p:cTn>
-                              </p:par>
-                            </p:childTnLst>
-                          </p:cTn>
-                        </p:par>
-                      </p:childTnLst>
-                    </p:cTn>
-                  </p:par>
-                  <p:par>
-                    <p:cTn id="38" fill="hold">
-                      <p:stCondLst>
-                        <p:cond delay="indefinite"/>
-                      </p:stCondLst>
-                      <p:childTnLst>
-                        <p:par>
-                          <p:cTn id="39" fill="hold">
-                            <p:stCondLst>
-                              <p:cond delay="0"/>
-                            </p:stCondLst>
-                            <p:childTnLst>
-                              <p:par>
-                                <p:cTn id="40" presetID="10" presetClass="entr" presetSubtype="0" fill="hold" grpId="0" nodeType="clickEffect">
-                                  <p:stCondLst>
-                                    <p:cond delay="0"/>
-                                  </p:stCondLst>
-                                  <p:childTnLst>
-                                    <p:set>
-                                      <p:cBhvr>
-                                        <p:cTn id="41" dur="1" fill="hold">
-                                          <p:stCondLst>
-                                            <p:cond delay="0"/>
-                                          </p:stCondLst>
-                                        </p:cTn>
-                                        <p:tgtEl>
-                                          <p:spTgt spid="13"/>
-                                        </p:tgtEl>
-                                        <p:attrNameLst>
-                                          <p:attrName>style.visibility</p:attrName>
-                                        </p:attrNameLst>
-                                      </p:cBhvr>
-                                      <p:to>
-                                        <p:strVal val="visible"/>
-                                      </p:to>
-                                    </p:set>
-                                    <p:animEffect transition="in" filter="fade">
-                                      <p:cBhvr>
-                                        <p:cTn id="42" dur="500"/>
                                         <p:tgtEl>
                                           <p:spTgt spid="13"/>
                                         </p:tgtEl>
@@ -9414,7 +9318,6 @@
       </p:par>
     </p:tnLst>
     <p:bldLst>
-      <p:bldP spid="3" grpId="0" build="p"/>
       <p:bldP spid="9" grpId="0"/>
       <p:bldP spid="10" grpId="0"/>
       <p:bldP spid="11" grpId="0"/>
@@ -11192,11 +11095,7 @@
                                           </p:stCondLst>
                                         </p:cTn>
                                         <p:tgtEl>
-                                          <p:spTgt spid="3">
-                                            <p:txEl>
-                                              <p:pRg st="0" end="0"/>
-                                            </p:txEl>
-                                          </p:spTgt>
+                                          <p:spTgt spid="6"/>
                                         </p:tgtEl>
                                         <p:attrNameLst>
                                           <p:attrName>style.visibility</p:attrName>
@@ -11210,11 +11109,7 @@
                                       <p:cBhvr>
                                         <p:cTn id="7" dur="500"/>
                                         <p:tgtEl>
-                                          <p:spTgt spid="3">
-                                            <p:txEl>
-                                              <p:pRg st="0" end="0"/>
-                                            </p:txEl>
-                                          </p:spTgt>
+                                          <p:spTgt spid="6"/>
                                         </p:tgtEl>
                                       </p:cBhvr>
                                     </p:animEffect>
@@ -11235,7 +11130,7 @@
                                           </p:stCondLst>
                                         </p:cTn>
                                         <p:tgtEl>
-                                          <p:spTgt spid="4"/>
+                                          <p:spTgt spid="8"/>
                                         </p:tgtEl>
                                         <p:attrNameLst>
                                           <p:attrName>style.visibility</p:attrName>
@@ -11249,94 +11144,6 @@
                                       <p:cBhvr>
                                         <p:cTn id="10" dur="500"/>
                                         <p:tgtEl>
-                                          <p:spTgt spid="4"/>
-                                        </p:tgtEl>
-                                      </p:cBhvr>
-                                    </p:animEffect>
-                                  </p:childTnLst>
-                                </p:cTn>
-                              </p:par>
-                            </p:childTnLst>
-                          </p:cTn>
-                        </p:par>
-                      </p:childTnLst>
-                    </p:cTn>
-                  </p:par>
-                  <p:par>
-                    <p:cTn id="11" fill="hold">
-                      <p:stCondLst>
-                        <p:cond delay="indefinite"/>
-                      </p:stCondLst>
-                      <p:childTnLst>
-                        <p:par>
-                          <p:cTn id="12" fill="hold">
-                            <p:stCondLst>
-                              <p:cond delay="0"/>
-                            </p:stCondLst>
-                            <p:childTnLst>
-                              <p:par>
-                                <p:cTn id="13" presetID="10" presetClass="entr" presetSubtype="0" fill="hold" grpId="0" nodeType="clickEffect">
-                                  <p:stCondLst>
-                                    <p:cond delay="0"/>
-                                  </p:stCondLst>
-                                  <p:childTnLst>
-                                    <p:set>
-                                      <p:cBhvr>
-                                        <p:cTn id="14" dur="1" fill="hold">
-                                          <p:stCondLst>
-                                            <p:cond delay="0"/>
-                                          </p:stCondLst>
-                                        </p:cTn>
-                                        <p:tgtEl>
-                                          <p:spTgt spid="6"/>
-                                        </p:tgtEl>
-                                        <p:attrNameLst>
-                                          <p:attrName>style.visibility</p:attrName>
-                                        </p:attrNameLst>
-                                      </p:cBhvr>
-                                      <p:to>
-                                        <p:strVal val="visible"/>
-                                      </p:to>
-                                    </p:set>
-                                    <p:animEffect transition="in" filter="fade">
-                                      <p:cBhvr>
-                                        <p:cTn id="15" dur="500"/>
-                                        <p:tgtEl>
-                                          <p:spTgt spid="6"/>
-                                        </p:tgtEl>
-                                      </p:cBhvr>
-                                    </p:animEffect>
-                                  </p:childTnLst>
-                                </p:cTn>
-                              </p:par>
-                              <p:par>
-                                <p:cTn id="16" presetID="10" presetClass="entr" presetSubtype="0" fill="hold" nodeType="withEffect">
-                                  <p:stCondLst>
-                                    <p:cond delay="0"/>
-                                  </p:stCondLst>
-                                  <p:childTnLst>
-                                    <p:set>
-                                      <p:cBhvr>
-                                        <p:cTn id="17" dur="1" fill="hold">
-                                          <p:stCondLst>
-                                            <p:cond delay="0"/>
-                                          </p:stCondLst>
-                                        </p:cTn>
-                                        <p:tgtEl>
-                                          <p:spTgt spid="8"/>
-                                        </p:tgtEl>
-                                        <p:attrNameLst>
-                                          <p:attrName>style.visibility</p:attrName>
-                                        </p:attrNameLst>
-                                      </p:cBhvr>
-                                      <p:to>
-                                        <p:strVal val="visible"/>
-                                      </p:to>
-                                    </p:set>
-                                    <p:animEffect transition="in" filter="fade">
-                                      <p:cBhvr>
-                                        <p:cTn id="18" dur="500"/>
-                                        <p:tgtEl>
                                           <p:spTgt spid="8"/>
                                         </p:tgtEl>
                                       </p:cBhvr>
@@ -11345,14 +11152,14 @@
                                 </p:cTn>
                               </p:par>
                               <p:par>
-                                <p:cTn id="19" presetID="10" presetClass="entr" presetSubtype="0" fill="hold" grpId="0" nodeType="withEffect">
+                                <p:cTn id="11" presetID="10" presetClass="entr" presetSubtype="0" fill="hold" grpId="0" nodeType="withEffect">
                                   <p:stCondLst>
                                     <p:cond delay="0"/>
                                   </p:stCondLst>
                                   <p:childTnLst>
                                     <p:set>
                                       <p:cBhvr>
-                                        <p:cTn id="20" dur="1" fill="hold">
+                                        <p:cTn id="12" dur="1" fill="hold">
                                           <p:stCondLst>
                                             <p:cond delay="0"/>
                                           </p:stCondLst>
@@ -11370,7 +11177,7 @@
                                     </p:set>
                                     <p:animEffect transition="in" filter="fade">
                                       <p:cBhvr>
-                                        <p:cTn id="21" dur="500"/>
+                                        <p:cTn id="13" dur="500"/>
                                         <p:tgtEl>
                                           <p:spTgt spid="5"/>
                                         </p:tgtEl>
@@ -11386,26 +11193,26 @@
                     </p:cTn>
                   </p:par>
                   <p:par>
-                    <p:cTn id="22" fill="hold">
+                    <p:cTn id="14" fill="hold">
                       <p:stCondLst>
                         <p:cond delay="indefinite"/>
                       </p:stCondLst>
                       <p:childTnLst>
                         <p:par>
-                          <p:cTn id="23" fill="hold">
+                          <p:cTn id="15" fill="hold">
                             <p:stCondLst>
                               <p:cond delay="0"/>
                             </p:stCondLst>
                             <p:childTnLst>
                               <p:par>
-                                <p:cTn id="24" presetID="10" presetClass="entr" presetSubtype="0" fill="hold" nodeType="clickEffect">
+                                <p:cTn id="16" presetID="10" presetClass="entr" presetSubtype="0" fill="hold" nodeType="clickEffect">
                                   <p:stCondLst>
                                     <p:cond delay="0"/>
                                   </p:stCondLst>
                                   <p:childTnLst>
                                     <p:set>
                                       <p:cBhvr>
-                                        <p:cTn id="25" dur="1" fill="hold">
+                                        <p:cTn id="17" dur="1" fill="hold">
                                           <p:stCondLst>
                                             <p:cond delay="0"/>
                                           </p:stCondLst>
@@ -11423,7 +11230,7 @@
                                     </p:set>
                                     <p:animEffect transition="in" filter="fade">
                                       <p:cBhvr>
-                                        <p:cTn id="26" dur="500"/>
+                                        <p:cTn id="18" dur="500"/>
                                         <p:tgtEl>
                                           <p:spTgt spid="10"/>
                                         </p:tgtEl>
@@ -11439,26 +11246,26 @@
                     </p:cTn>
                   </p:par>
                   <p:par>
-                    <p:cTn id="27" fill="hold">
+                    <p:cTn id="19" fill="hold">
                       <p:stCondLst>
                         <p:cond delay="indefinite"/>
                       </p:stCondLst>
                       <p:childTnLst>
                         <p:par>
-                          <p:cTn id="28" fill="hold">
+                          <p:cTn id="20" fill="hold">
                             <p:stCondLst>
                               <p:cond delay="0"/>
                             </p:stCondLst>
                             <p:childTnLst>
                               <p:par>
-                                <p:cTn id="29" presetID="10" presetClass="entr" presetSubtype="0" fill="hold" grpId="0" nodeType="clickEffect">
+                                <p:cTn id="21" presetID="10" presetClass="entr" presetSubtype="0" fill="hold" grpId="0" nodeType="clickEffect">
                                   <p:stCondLst>
                                     <p:cond delay="0"/>
                                   </p:stCondLst>
                                   <p:childTnLst>
                                     <p:set>
                                       <p:cBhvr>
-                                        <p:cTn id="30" dur="1" fill="hold">
+                                        <p:cTn id="22" dur="1" fill="hold">
                                           <p:stCondLst>
                                             <p:cond delay="0"/>
                                           </p:stCondLst>
@@ -11476,9 +11283,44 @@
                                     </p:set>
                                     <p:animEffect transition="in" filter="fade">
                                       <p:cBhvr>
-                                        <p:cTn id="31" dur="500"/>
+                                        <p:cTn id="23" dur="500"/>
                                         <p:tgtEl>
                                           <p:spTgt spid="11"/>
+                                        </p:tgtEl>
+                                      </p:cBhvr>
+                                    </p:animEffect>
+                                  </p:childTnLst>
+                                </p:cTn>
+                              </p:par>
+                              <p:par>
+                                <p:cTn id="24" presetID="10" presetClass="entr" presetSubtype="0" fill="hold" nodeType="withEffect">
+                                  <p:stCondLst>
+                                    <p:cond delay="0"/>
+                                  </p:stCondLst>
+                                  <p:childTnLst>
+                                    <p:set>
+                                      <p:cBhvr>
+                                        <p:cTn id="25" dur="1" fill="hold">
+                                          <p:stCondLst>
+                                            <p:cond delay="0"/>
+                                          </p:stCondLst>
+                                        </p:cTn>
+                                        <p:tgtEl>
+                                          <p:spTgt spid="13"/>
+                                        </p:tgtEl>
+                                        <p:attrNameLst>
+                                          <p:attrName>style.visibility</p:attrName>
+                                        </p:attrNameLst>
+                                      </p:cBhvr>
+                                      <p:to>
+                                        <p:strVal val="visible"/>
+                                      </p:to>
+                                    </p:set>
+                                    <p:animEffect transition="in" filter="fade">
+                                      <p:cBhvr>
+                                        <p:cTn id="26" dur="500"/>
+                                        <p:tgtEl>
+                                          <p:spTgt spid="13"/>
                                         </p:tgtEl>
                                       </p:cBhvr>
                                     </p:animEffect>
@@ -11513,7 +11355,6 @@
       </p:par>
     </p:tnLst>
     <p:bldLst>
-      <p:bldP spid="3" grpId="0" build="p"/>
       <p:bldP spid="5" grpId="0"/>
       <p:bldP spid="6" grpId="0"/>
       <p:bldP spid="11" grpId="0"/>
@@ -12423,7 +12264,7 @@
         </p:blipFill>
         <p:spPr>
           <a:xfrm>
-            <a:off x="4422775" y="5333030"/>
+            <a:off x="4456288" y="5391332"/>
             <a:ext cx="2321364" cy="784982"/>
           </a:xfrm>
           <a:prstGeom prst="rect">
@@ -14051,6 +13892,48 @@
           </p:sp>
         </mc:Fallback>
       </mc:AlternateContent>
+      <p:sp>
+        <p:nvSpPr>
+          <p:cNvPr id="3" name="文本框 2">
+            <a:extLst>
+              <a:ext uri="{FF2B5EF4-FFF2-40B4-BE49-F238E27FC236}">
+                <a16:creationId xmlns:a16="http://schemas.microsoft.com/office/drawing/2014/main" id="{06190673-9E66-4E27-AAB9-46A8F9F6B582}"/>
+              </a:ext>
+            </a:extLst>
+          </p:cNvPr>
+          <p:cNvSpPr txBox="1"/>
+          <p:nvPr/>
+        </p:nvSpPr>
+        <p:spPr>
+          <a:xfrm>
+            <a:off x="7366897" y="5180186"/>
+            <a:ext cx="2366353" cy="461665"/>
+          </a:xfrm>
+          <a:prstGeom prst="rect">
+            <a:avLst/>
+          </a:prstGeom>
+          <a:noFill/>
+        </p:spPr>
+        <p:txBody>
+          <a:bodyPr wrap="none" rtlCol="0">
+            <a:spAutoFit/>
+          </a:bodyPr>
+          <a:lstStyle/>
+          <a:p>
+            <a:r>
+              <a:rPr lang="en-US" altLang="zh-CN" sz="2400" b="1" dirty="0">
+                <a:latin typeface="Times New Roman" panose="02020603050405020304" pitchFamily="18" charset="0"/>
+                <a:cs typeface="Times New Roman" panose="02020603050405020304" pitchFamily="18" charset="0"/>
+              </a:rPr>
+              <a:t>Consensus OMP</a:t>
+            </a:r>
+            <a:endParaRPr lang="zh-CN" altLang="en-US" sz="2400" b="1" dirty="0">
+              <a:latin typeface="Times New Roman" panose="02020603050405020304" pitchFamily="18" charset="0"/>
+              <a:cs typeface="Times New Roman" panose="02020603050405020304" pitchFamily="18" charset="0"/>
+            </a:endParaRPr>
+          </a:p>
+        </p:txBody>
+      </p:sp>
     </p:spTree>
     <p:extLst>
       <p:ext uri="{BB962C8B-B14F-4D97-AF65-F5344CB8AC3E}">
@@ -14095,7 +13978,7 @@
                                           </p:stCondLst>
                                         </p:cTn>
                                         <p:tgtEl>
-                                          <p:spTgt spid="5"/>
+                                          <p:spTgt spid="8"/>
                                         </p:tgtEl>
                                         <p:attrNameLst>
                                           <p:attrName>style.visibility</p:attrName>
@@ -14109,7 +13992,7 @@
                                       <p:cBhvr>
                                         <p:cTn id="7" dur="500"/>
                                         <p:tgtEl>
-                                          <p:spTgt spid="5"/>
+                                          <p:spTgt spid="8"/>
                                         </p:tgtEl>
                                       </p:cBhvr>
                                     </p:animEffect>
@@ -14130,7 +14013,7 @@
                                           </p:stCondLst>
                                         </p:cTn>
                                         <p:tgtEl>
-                                          <p:spTgt spid="7"/>
+                                          <p:spTgt spid="6"/>
                                         </p:tgtEl>
                                         <p:attrNameLst>
                                           <p:attrName>style.visibility</p:attrName>
@@ -14144,42 +14027,7 @@
                                       <p:cBhvr>
                                         <p:cTn id="10" dur="500"/>
                                         <p:tgtEl>
-                                          <p:spTgt spid="7"/>
-                                        </p:tgtEl>
-                                      </p:cBhvr>
-                                    </p:animEffect>
-                                  </p:childTnLst>
-                                </p:cTn>
-                              </p:par>
-                              <p:par>
-                                <p:cTn id="11" presetID="10" presetClass="entr" presetSubtype="0" fill="hold" nodeType="withEffect">
-                                  <p:stCondLst>
-                                    <p:cond delay="0"/>
-                                  </p:stCondLst>
-                                  <p:childTnLst>
-                                    <p:set>
-                                      <p:cBhvr>
-                                        <p:cTn id="12" dur="1" fill="hold">
-                                          <p:stCondLst>
-                                            <p:cond delay="0"/>
-                                          </p:stCondLst>
-                                        </p:cTn>
-                                        <p:tgtEl>
-                                          <p:spTgt spid="4"/>
-                                        </p:tgtEl>
-                                        <p:attrNameLst>
-                                          <p:attrName>style.visibility</p:attrName>
-                                        </p:attrNameLst>
-                                      </p:cBhvr>
-                                      <p:to>
-                                        <p:strVal val="visible"/>
-                                      </p:to>
-                                    </p:set>
-                                    <p:animEffect transition="in" filter="fade">
-                                      <p:cBhvr>
-                                        <p:cTn id="13" dur="500"/>
-                                        <p:tgtEl>
-                                          <p:spTgt spid="4"/>
+                                          <p:spTgt spid="6"/>
                                         </p:tgtEl>
                                       </p:cBhvr>
                                     </p:animEffect>
@@ -14193,79 +14041,26 @@
                     </p:cTn>
                   </p:par>
                   <p:par>
-                    <p:cTn id="14" fill="hold">
+                    <p:cTn id="11" fill="hold">
                       <p:stCondLst>
                         <p:cond delay="indefinite"/>
                       </p:stCondLst>
                       <p:childTnLst>
                         <p:par>
-                          <p:cTn id="15" fill="hold">
+                          <p:cTn id="12" fill="hold">
                             <p:stCondLst>
                               <p:cond delay="0"/>
                             </p:stCondLst>
                             <p:childTnLst>
                               <p:par>
-                                <p:cTn id="16" presetID="10" presetClass="entr" presetSubtype="0" fill="hold" grpId="0" nodeType="clickEffect">
+                                <p:cTn id="13" presetID="10" presetClass="entr" presetSubtype="0" fill="hold" grpId="0" nodeType="clickEffect">
                                   <p:stCondLst>
                                     <p:cond delay="0"/>
                                   </p:stCondLst>
                                   <p:childTnLst>
                                     <p:set>
                                       <p:cBhvr>
-                                        <p:cTn id="17" dur="1" fill="hold">
-                                          <p:stCondLst>
-                                            <p:cond delay="0"/>
-                                          </p:stCondLst>
-                                        </p:cTn>
-                                        <p:tgtEl>
-                                          <p:spTgt spid="8"/>
-                                        </p:tgtEl>
-                                        <p:attrNameLst>
-                                          <p:attrName>style.visibility</p:attrName>
-                                        </p:attrNameLst>
-                                      </p:cBhvr>
-                                      <p:to>
-                                        <p:strVal val="visible"/>
-                                      </p:to>
-                                    </p:set>
-                                    <p:animEffect transition="in" filter="fade">
-                                      <p:cBhvr>
-                                        <p:cTn id="18" dur="500"/>
-                                        <p:tgtEl>
-                                          <p:spTgt spid="8"/>
-                                        </p:tgtEl>
-                                      </p:cBhvr>
-                                    </p:animEffect>
-                                  </p:childTnLst>
-                                </p:cTn>
-                              </p:par>
-                            </p:childTnLst>
-                          </p:cTn>
-                        </p:par>
-                      </p:childTnLst>
-                    </p:cTn>
-                  </p:par>
-                  <p:par>
-                    <p:cTn id="19" fill="hold">
-                      <p:stCondLst>
-                        <p:cond delay="indefinite"/>
-                      </p:stCondLst>
-                      <p:childTnLst>
-                        <p:par>
-                          <p:cTn id="20" fill="hold">
-                            <p:stCondLst>
-                              <p:cond delay="0"/>
-                            </p:stCondLst>
-                            <p:childTnLst>
-                              <p:par>
-                                <p:cTn id="21" presetID="10" presetClass="entr" presetSubtype="0" fill="hold" grpId="0" nodeType="clickEffect">
-                                  <p:stCondLst>
-                                    <p:cond delay="0"/>
-                                  </p:stCondLst>
-                                  <p:childTnLst>
-                                    <p:set>
-                                      <p:cBhvr>
-                                        <p:cTn id="22" dur="1" fill="hold">
+                                        <p:cTn id="14" dur="1" fill="hold">
                                           <p:stCondLst>
                                             <p:cond delay="0"/>
                                           </p:stCondLst>
@@ -14283,9 +14078,203 @@
                                     </p:set>
                                     <p:animEffect transition="in" filter="fade">
                                       <p:cBhvr>
-                                        <p:cTn id="23" dur="500"/>
+                                        <p:cTn id="15" dur="500"/>
                                         <p:tgtEl>
                                           <p:spTgt spid="9"/>
+                                        </p:tgtEl>
+                                      </p:cBhvr>
+                                    </p:animEffect>
+                                  </p:childTnLst>
+                                </p:cTn>
+                              </p:par>
+                            </p:childTnLst>
+                          </p:cTn>
+                        </p:par>
+                      </p:childTnLst>
+                    </p:cTn>
+                  </p:par>
+                  <p:par>
+                    <p:cTn id="16" fill="hold">
+                      <p:stCondLst>
+                        <p:cond delay="indefinite"/>
+                      </p:stCondLst>
+                      <p:childTnLst>
+                        <p:par>
+                          <p:cTn id="17" fill="hold">
+                            <p:stCondLst>
+                              <p:cond delay="0"/>
+                            </p:stCondLst>
+                            <p:childTnLst>
+                              <p:par>
+                                <p:cTn id="18" presetID="10" presetClass="entr" presetSubtype="0" fill="hold" nodeType="clickEffect">
+                                  <p:stCondLst>
+                                    <p:cond delay="0"/>
+                                  </p:stCondLst>
+                                  <p:childTnLst>
+                                    <p:set>
+                                      <p:cBhvr>
+                                        <p:cTn id="19" dur="1" fill="hold">
+                                          <p:stCondLst>
+                                            <p:cond delay="0"/>
+                                          </p:stCondLst>
+                                        </p:cTn>
+                                        <p:tgtEl>
+                                          <p:spTgt spid="11"/>
+                                        </p:tgtEl>
+                                        <p:attrNameLst>
+                                          <p:attrName>style.visibility</p:attrName>
+                                        </p:attrNameLst>
+                                      </p:cBhvr>
+                                      <p:to>
+                                        <p:strVal val="visible"/>
+                                      </p:to>
+                                    </p:set>
+                                    <p:animEffect transition="in" filter="fade">
+                                      <p:cBhvr>
+                                        <p:cTn id="20" dur="500"/>
+                                        <p:tgtEl>
+                                          <p:spTgt spid="11"/>
+                                        </p:tgtEl>
+                                      </p:cBhvr>
+                                    </p:animEffect>
+                                  </p:childTnLst>
+                                </p:cTn>
+                              </p:par>
+                            </p:childTnLst>
+                          </p:cTn>
+                        </p:par>
+                      </p:childTnLst>
+                    </p:cTn>
+                  </p:par>
+                  <p:par>
+                    <p:cTn id="21" fill="hold">
+                      <p:stCondLst>
+                        <p:cond delay="indefinite"/>
+                      </p:stCondLst>
+                      <p:childTnLst>
+                        <p:par>
+                          <p:cTn id="22" fill="hold">
+                            <p:stCondLst>
+                              <p:cond delay="0"/>
+                            </p:stCondLst>
+                            <p:childTnLst>
+                              <p:par>
+                                <p:cTn id="23" presetID="10" presetClass="entr" presetSubtype="0" fill="hold" grpId="0" nodeType="clickEffect">
+                                  <p:stCondLst>
+                                    <p:cond delay="0"/>
+                                  </p:stCondLst>
+                                  <p:childTnLst>
+                                    <p:set>
+                                      <p:cBhvr>
+                                        <p:cTn id="24" dur="1" fill="hold">
+                                          <p:stCondLst>
+                                            <p:cond delay="0"/>
+                                          </p:stCondLst>
+                                        </p:cTn>
+                                        <p:tgtEl>
+                                          <p:spTgt spid="14"/>
+                                        </p:tgtEl>
+                                        <p:attrNameLst>
+                                          <p:attrName>style.visibility</p:attrName>
+                                        </p:attrNameLst>
+                                      </p:cBhvr>
+                                      <p:to>
+                                        <p:strVal val="visible"/>
+                                      </p:to>
+                                    </p:set>
+                                    <p:animEffect transition="in" filter="fade">
+                                      <p:cBhvr>
+                                        <p:cTn id="25" dur="500"/>
+                                        <p:tgtEl>
+                                          <p:spTgt spid="14"/>
+                                        </p:tgtEl>
+                                      </p:cBhvr>
+                                    </p:animEffect>
+                                  </p:childTnLst>
+                                </p:cTn>
+                              </p:par>
+                              <p:par>
+                                <p:cTn id="26" presetID="10" presetClass="entr" presetSubtype="0" fill="hold" nodeType="withEffect">
+                                  <p:stCondLst>
+                                    <p:cond delay="0"/>
+                                  </p:stCondLst>
+                                  <p:childTnLst>
+                                    <p:set>
+                                      <p:cBhvr>
+                                        <p:cTn id="27" dur="1" fill="hold">
+                                          <p:stCondLst>
+                                            <p:cond delay="0"/>
+                                          </p:stCondLst>
+                                        </p:cTn>
+                                        <p:tgtEl>
+                                          <p:spTgt spid="13"/>
+                                        </p:tgtEl>
+                                        <p:attrNameLst>
+                                          <p:attrName>style.visibility</p:attrName>
+                                        </p:attrNameLst>
+                                      </p:cBhvr>
+                                      <p:to>
+                                        <p:strVal val="visible"/>
+                                      </p:to>
+                                    </p:set>
+                                    <p:animEffect transition="in" filter="fade">
+                                      <p:cBhvr>
+                                        <p:cTn id="28" dur="500"/>
+                                        <p:tgtEl>
+                                          <p:spTgt spid="13"/>
+                                        </p:tgtEl>
+                                      </p:cBhvr>
+                                    </p:animEffect>
+                                  </p:childTnLst>
+                                </p:cTn>
+                              </p:par>
+                            </p:childTnLst>
+                          </p:cTn>
+                        </p:par>
+                      </p:childTnLst>
+                    </p:cTn>
+                  </p:par>
+                  <p:par>
+                    <p:cTn id="29" fill="hold">
+                      <p:stCondLst>
+                        <p:cond delay="indefinite"/>
+                      </p:stCondLst>
+                      <p:childTnLst>
+                        <p:par>
+                          <p:cTn id="30" fill="hold">
+                            <p:stCondLst>
+                              <p:cond delay="0"/>
+                            </p:stCondLst>
+                            <p:childTnLst>
+                              <p:par>
+                                <p:cTn id="31" presetID="10" presetClass="entr" presetSubtype="0" fill="hold" grpId="0" nodeType="clickEffect">
+                                  <p:stCondLst>
+                                    <p:cond delay="0"/>
+                                  </p:stCondLst>
+                                  <p:childTnLst>
+                                    <p:set>
+                                      <p:cBhvr>
+                                        <p:cTn id="32" dur="1" fill="hold">
+                                          <p:stCondLst>
+                                            <p:cond delay="0"/>
+                                          </p:stCondLst>
+                                        </p:cTn>
+                                        <p:tgtEl>
+                                          <p:spTgt spid="3"/>
+                                        </p:tgtEl>
+                                        <p:attrNameLst>
+                                          <p:attrName>style.visibility</p:attrName>
+                                        </p:attrNameLst>
+                                      </p:cBhvr>
+                                      <p:to>
+                                        <p:strVal val="visible"/>
+                                      </p:to>
+                                    </p:set>
+                                    <p:animEffect transition="in" filter="fade">
+                                      <p:cBhvr>
+                                        <p:cTn id="33" dur="500"/>
+                                        <p:tgtEl>
+                                          <p:spTgt spid="3"/>
                                         </p:tgtEl>
                                       </p:cBhvr>
                                     </p:animEffect>
@@ -14320,9 +14309,10 @@
       </p:par>
     </p:tnLst>
     <p:bldLst>
-      <p:bldP spid="5" grpId="0"/>
       <p:bldP spid="8" grpId="0"/>
       <p:bldP spid="9" grpId="0"/>
+      <p:bldP spid="14" grpId="0"/>
+      <p:bldP spid="3" grpId="0"/>
     </p:bldLst>
   </p:timing>
 </p:sld>
@@ -14380,8 +14370,8 @@
           </a:p>
         </p:txBody>
       </p:sp>
-      <mc:AlternateContent xmlns:mc="http://schemas.openxmlformats.org/markup-compatibility/2006">
-        <mc:Choice xmlns:a14="http://schemas.microsoft.com/office/drawing/2010/main" Requires="a14">
+      <mc:AlternateContent xmlns:mc="http://schemas.openxmlformats.org/markup-compatibility/2006" xmlns:a14="http://schemas.microsoft.com/office/drawing/2010/main">
+        <mc:Choice Requires="a14">
           <p:sp>
             <p:nvSpPr>
               <p:cNvPr id="3" name="内容占位符 2">
@@ -14797,7 +14787,7 @@
             </p:txBody>
           </p:sp>
         </mc:Choice>
-        <mc:Fallback>
+        <mc:Fallback xmlns="">
           <p:sp>
             <p:nvSpPr>
               <p:cNvPr id="3" name="内容占位符 2">
@@ -15044,8 +15034,8 @@
           </a:p>
         </p:txBody>
       </p:sp>
-      <mc:AlternateContent xmlns:mc="http://schemas.openxmlformats.org/markup-compatibility/2006">
-        <mc:Choice xmlns:a14="http://schemas.microsoft.com/office/drawing/2010/main" Requires="a14">
+      <mc:AlternateContent xmlns:mc="http://schemas.openxmlformats.org/markup-compatibility/2006" xmlns:a14="http://schemas.microsoft.com/office/drawing/2010/main">
+        <mc:Choice Requires="a14">
           <p:sp>
             <p:nvSpPr>
               <p:cNvPr id="3" name="内容占位符 2">
@@ -15229,7 +15219,7 @@
             </p:txBody>
           </p:sp>
         </mc:Choice>
-        <mc:Fallback>
+        <mc:Fallback xmlns="">
           <p:sp>
             <p:nvSpPr>
               <p:cNvPr id="3" name="内容占位符 2">
@@ -15368,8 +15358,8 @@
           </a:p>
         </p:txBody>
       </p:sp>
-      <mc:AlternateContent xmlns:mc="http://schemas.openxmlformats.org/markup-compatibility/2006">
-        <mc:Choice xmlns:a14="http://schemas.microsoft.com/office/drawing/2010/main" Requires="a14">
+      <mc:AlternateContent xmlns:mc="http://schemas.openxmlformats.org/markup-compatibility/2006" xmlns:a14="http://schemas.microsoft.com/office/drawing/2010/main">
+        <mc:Choice Requires="a14">
           <p:sp>
             <p:nvSpPr>
               <p:cNvPr id="3" name="内容占位符 2">
@@ -15553,7 +15543,7 @@
             </p:txBody>
           </p:sp>
         </mc:Choice>
-        <mc:Fallback>
+        <mc:Fallback xmlns="">
           <p:sp>
             <p:nvSpPr>
               <p:cNvPr id="3" name="内容占位符 2">
@@ -16932,6 +16922,49 @@
                                   </p:childTnLst>
                                 </p:cTn>
                               </p:par>
+                              <p:par>
+                                <p:cTn id="11" presetID="10" presetClass="entr" presetSubtype="0" fill="hold" grpId="0" nodeType="withEffect">
+                                  <p:stCondLst>
+                                    <p:cond delay="0"/>
+                                  </p:stCondLst>
+                                  <p:childTnLst>
+                                    <p:set>
+                                      <p:cBhvr>
+                                        <p:cTn id="12" dur="1" fill="hold">
+                                          <p:stCondLst>
+                                            <p:cond delay="0"/>
+                                          </p:stCondLst>
+                                        </p:cTn>
+                                        <p:tgtEl>
+                                          <p:spTgt spid="3">
+                                            <p:txEl>
+                                              <p:pRg st="2" end="2"/>
+                                            </p:txEl>
+                                          </p:spTgt>
+                                        </p:tgtEl>
+                                        <p:attrNameLst>
+                                          <p:attrName>style.visibility</p:attrName>
+                                        </p:attrNameLst>
+                                      </p:cBhvr>
+                                      <p:to>
+                                        <p:strVal val="visible"/>
+                                      </p:to>
+                                    </p:set>
+                                    <p:animEffect transition="in" filter="fade">
+                                      <p:cBhvr>
+                                        <p:cTn id="13" dur="500"/>
+                                        <p:tgtEl>
+                                          <p:spTgt spid="3">
+                                            <p:txEl>
+                                              <p:pRg st="2" end="2"/>
+                                            </p:txEl>
+                                          </p:spTgt>
+                                        </p:tgtEl>
+                                      </p:cBhvr>
+                                    </p:animEffect>
+                                  </p:childTnLst>
+                                </p:cTn>
+                              </p:par>
                             </p:childTnLst>
                           </p:cTn>
                         </p:par>
@@ -16939,26 +16972,26 @@
                     </p:cTn>
                   </p:par>
                   <p:par>
-                    <p:cTn id="11" fill="hold">
+                    <p:cTn id="14" fill="hold">
                       <p:stCondLst>
                         <p:cond delay="indefinite"/>
                       </p:stCondLst>
                       <p:childTnLst>
                         <p:par>
-                          <p:cTn id="12" fill="hold">
+                          <p:cTn id="15" fill="hold">
                             <p:stCondLst>
                               <p:cond delay="0"/>
                             </p:stCondLst>
                             <p:childTnLst>
                               <p:par>
-                                <p:cTn id="13" presetID="10" presetClass="entr" presetSubtype="0" fill="hold" grpId="0" nodeType="clickEffect">
+                                <p:cTn id="16" presetID="10" presetClass="entr" presetSubtype="0" fill="hold" grpId="0" nodeType="clickEffect">
                                   <p:stCondLst>
                                     <p:cond delay="0"/>
                                   </p:stCondLst>
                                   <p:childTnLst>
                                     <p:set>
                                       <p:cBhvr>
-                                        <p:cTn id="14" dur="1" fill="hold">
+                                        <p:cTn id="17" dur="1" fill="hold">
                                           <p:stCondLst>
                                             <p:cond delay="0"/>
                                           </p:stCondLst>
@@ -16976,7 +17009,7 @@
                                     </p:set>
                                     <p:animEffect transition="in" filter="fade">
                                       <p:cBhvr>
-                                        <p:cTn id="15" dur="500"/>
+                                        <p:cTn id="18" dur="500"/>
                                         <p:tgtEl>
                                           <p:spTgt spid="6"/>
                                         </p:tgtEl>
@@ -16992,26 +17025,26 @@
                     </p:cTn>
                   </p:par>
                   <p:par>
-                    <p:cTn id="16" fill="hold">
+                    <p:cTn id="19" fill="hold">
                       <p:stCondLst>
                         <p:cond delay="indefinite"/>
                       </p:stCondLst>
                       <p:childTnLst>
                         <p:par>
-                          <p:cTn id="17" fill="hold">
+                          <p:cTn id="20" fill="hold">
                             <p:stCondLst>
                               <p:cond delay="0"/>
                             </p:stCondLst>
                             <p:childTnLst>
                               <p:par>
-                                <p:cTn id="18" presetID="10" presetClass="entr" presetSubtype="0" fill="hold" grpId="0" nodeType="clickEffect">
+                                <p:cTn id="21" presetID="10" presetClass="entr" presetSubtype="0" fill="hold" grpId="0" nodeType="clickEffect">
                                   <p:stCondLst>
                                     <p:cond delay="0"/>
                                   </p:stCondLst>
                                   <p:childTnLst>
                                     <p:set>
                                       <p:cBhvr>
-                                        <p:cTn id="19" dur="1" fill="hold">
+                                        <p:cTn id="22" dur="1" fill="hold">
                                           <p:stCondLst>
                                             <p:cond delay="0"/>
                                           </p:stCondLst>
@@ -17029,7 +17062,7 @@
                                     </p:set>
                                     <p:animEffect transition="in" filter="fade">
                                       <p:cBhvr>
-                                        <p:cTn id="20" dur="500"/>
+                                        <p:cTn id="23" dur="500"/>
                                         <p:tgtEl>
                                           <p:spTgt spid="7"/>
                                         </p:tgtEl>
@@ -17045,26 +17078,26 @@
                     </p:cTn>
                   </p:par>
                   <p:par>
-                    <p:cTn id="21" fill="hold">
+                    <p:cTn id="24" fill="hold">
                       <p:stCondLst>
                         <p:cond delay="indefinite"/>
                       </p:stCondLst>
                       <p:childTnLst>
                         <p:par>
-                          <p:cTn id="22" fill="hold">
+                          <p:cTn id="25" fill="hold">
                             <p:stCondLst>
                               <p:cond delay="0"/>
                             </p:stCondLst>
                             <p:childTnLst>
                               <p:par>
-                                <p:cTn id="23" presetID="10" presetClass="entr" presetSubtype="0" fill="hold" grpId="0" nodeType="clickEffect">
+                                <p:cTn id="26" presetID="10" presetClass="entr" presetSubtype="0" fill="hold" grpId="0" nodeType="clickEffect">
                                   <p:stCondLst>
                                     <p:cond delay="0"/>
                                   </p:stCondLst>
                                   <p:childTnLst>
                                     <p:set>
                                       <p:cBhvr>
-                                        <p:cTn id="24" dur="1" fill="hold">
+                                        <p:cTn id="27" dur="1" fill="hold">
                                           <p:stCondLst>
                                             <p:cond delay="0"/>
                                           </p:stCondLst>
@@ -17082,7 +17115,7 @@
                                     </p:set>
                                     <p:animEffect transition="in" filter="fade">
                                       <p:cBhvr>
-                                        <p:cTn id="25" dur="500"/>
+                                        <p:cTn id="28" dur="500"/>
                                         <p:tgtEl>
                                           <p:spTgt spid="8"/>
                                         </p:tgtEl>
@@ -17098,26 +17131,26 @@
                     </p:cTn>
                   </p:par>
                   <p:par>
-                    <p:cTn id="26" fill="hold">
+                    <p:cTn id="29" fill="hold">
                       <p:stCondLst>
                         <p:cond delay="indefinite"/>
                       </p:stCondLst>
                       <p:childTnLst>
                         <p:par>
-                          <p:cTn id="27" fill="hold">
+                          <p:cTn id="30" fill="hold">
                             <p:stCondLst>
                               <p:cond delay="0"/>
                             </p:stCondLst>
                             <p:childTnLst>
                               <p:par>
-                                <p:cTn id="28" presetID="10" presetClass="entr" presetSubtype="0" fill="hold" grpId="0" nodeType="clickEffect">
+                                <p:cTn id="31" presetID="10" presetClass="entr" presetSubtype="0" fill="hold" grpId="0" nodeType="clickEffect">
                                   <p:stCondLst>
                                     <p:cond delay="0"/>
                                   </p:stCondLst>
                                   <p:childTnLst>
                                     <p:set>
                                       <p:cBhvr>
-                                        <p:cTn id="29" dur="1" fill="hold">
+                                        <p:cTn id="32" dur="1" fill="hold">
                                           <p:stCondLst>
                                             <p:cond delay="0"/>
                                           </p:stCondLst>
@@ -17135,7 +17168,7 @@
                                     </p:set>
                                     <p:animEffect transition="in" filter="fade">
                                       <p:cBhvr>
-                                        <p:cTn id="30" dur="500"/>
+                                        <p:cTn id="33" dur="500"/>
                                         <p:tgtEl>
                                           <p:spTgt spid="9"/>
                                         </p:tgtEl>
@@ -17260,20 +17293,6 @@
           <a:bodyPr/>
           <a:lstStyle/>
           <a:p>
-            <a:r>
-              <a:rPr lang="en-US" altLang="zh-CN" dirty="0">
-                <a:latin typeface="Times New Roman" panose="02020603050405020304" pitchFamily="18" charset="0"/>
-                <a:cs typeface="Times New Roman" panose="02020603050405020304" pitchFamily="18" charset="0"/>
-              </a:rPr>
-              <a:t>Questions</a:t>
-            </a:r>
-            <a:r>
-              <a:rPr lang="zh-CN" altLang="en-US" dirty="0">
-                <a:latin typeface="Times New Roman" panose="02020603050405020304" pitchFamily="18" charset="0"/>
-                <a:cs typeface="Times New Roman" panose="02020603050405020304" pitchFamily="18" charset="0"/>
-              </a:rPr>
-              <a:t>较多，</a:t>
-            </a:r>
             <a:r>
               <a:rPr lang="en-US" altLang="zh-CN" dirty="0">
                 <a:latin typeface="Times New Roman" panose="02020603050405020304" pitchFamily="18" charset="0"/>
@@ -17630,6 +17649,92 @@
   <p:clrMapOvr>
     <a:masterClrMapping/>
   </p:clrMapOvr>
+  <p:timing>
+    <p:tnLst>
+      <p:par>
+        <p:cTn id="1" dur="indefinite" restart="never" nodeType="tmRoot">
+          <p:childTnLst>
+            <p:seq concurrent="1" nextAc="seek">
+              <p:cTn id="2" dur="indefinite" nodeType="mainSeq">
+                <p:childTnLst>
+                  <p:par>
+                    <p:cTn id="3" fill="hold">
+                      <p:stCondLst>
+                        <p:cond delay="indefinite"/>
+                      </p:stCondLst>
+                      <p:childTnLst>
+                        <p:par>
+                          <p:cTn id="4" fill="hold">
+                            <p:stCondLst>
+                              <p:cond delay="0"/>
+                            </p:stCondLst>
+                            <p:childTnLst>
+                              <p:par>
+                                <p:cTn id="5" presetID="10" presetClass="entr" presetSubtype="0" fill="hold" grpId="0" nodeType="clickEffect">
+                                  <p:stCondLst>
+                                    <p:cond delay="0"/>
+                                  </p:stCondLst>
+                                  <p:childTnLst>
+                                    <p:set>
+                                      <p:cBhvr>
+                                        <p:cTn id="6" dur="1" fill="hold">
+                                          <p:stCondLst>
+                                            <p:cond delay="0"/>
+                                          </p:stCondLst>
+                                        </p:cTn>
+                                        <p:tgtEl>
+                                          <p:spTgt spid="3"/>
+                                        </p:tgtEl>
+                                        <p:attrNameLst>
+                                          <p:attrName>style.visibility</p:attrName>
+                                        </p:attrNameLst>
+                                      </p:cBhvr>
+                                      <p:to>
+                                        <p:strVal val="visible"/>
+                                      </p:to>
+                                    </p:set>
+                                    <p:animEffect transition="in" filter="fade">
+                                      <p:cBhvr>
+                                        <p:cTn id="7" dur="500"/>
+                                        <p:tgtEl>
+                                          <p:spTgt spid="3"/>
+                                        </p:tgtEl>
+                                      </p:cBhvr>
+                                    </p:animEffect>
+                                  </p:childTnLst>
+                                </p:cTn>
+                              </p:par>
+                            </p:childTnLst>
+                          </p:cTn>
+                        </p:par>
+                      </p:childTnLst>
+                    </p:cTn>
+                  </p:par>
+                </p:childTnLst>
+              </p:cTn>
+              <p:prevCondLst>
+                <p:cond evt="onPrev" delay="0">
+                  <p:tgtEl>
+                    <p:sldTgt/>
+                  </p:tgtEl>
+                </p:cond>
+              </p:prevCondLst>
+              <p:nextCondLst>
+                <p:cond evt="onNext" delay="0">
+                  <p:tgtEl>
+                    <p:sldTgt/>
+                  </p:tgtEl>
+                </p:cond>
+              </p:nextCondLst>
+            </p:seq>
+          </p:childTnLst>
+        </p:cTn>
+      </p:par>
+    </p:tnLst>
+    <p:bldLst>
+      <p:bldP spid="3" grpId="0"/>
+    </p:bldLst>
+  </p:timing>
 </p:sld>
 </file>
 
@@ -17650,6 +17755,534 @@
           <a:chExt cx="0" cy="0"/>
         </a:xfrm>
       </p:grpSpPr>
+      <p:sp>
+        <p:nvSpPr>
+          <p:cNvPr id="6" name="Rectangle 2">
+            <a:extLst>
+              <a:ext uri="{FF2B5EF4-FFF2-40B4-BE49-F238E27FC236}">
+                <a16:creationId xmlns:a16="http://schemas.microsoft.com/office/drawing/2014/main" id="{AA6A9488-9A7D-40CE-9E27-727FB215E494}"/>
+              </a:ext>
+            </a:extLst>
+          </p:cNvPr>
+          <p:cNvSpPr>
+            <a:spLocks noGrp="1" noChangeArrowheads="1"/>
+          </p:cNvSpPr>
+          <p:nvPr>
+            <p:ph idx="1"/>
+          </p:nvPr>
+        </p:nvSpPr>
+        <p:spPr bwMode="auto">
+          <a:xfrm>
+            <a:off x="689486" y="1606782"/>
+            <a:ext cx="10813027" cy="4761099"/>
+          </a:xfrm>
+          <a:prstGeom prst="rect">
+            <a:avLst/>
+          </a:prstGeom>
+          <a:noFill/>
+          <a:ln>
+            <a:noFill/>
+          </a:ln>
+          <a:effectLst/>
+          <a:extLst>
+            <a:ext uri="{909E8E84-426E-40DD-AFC4-6F175D3DCCD1}">
+              <a14:hiddenFill xmlns:a14="http://schemas.microsoft.com/office/drawing/2010/main">
+                <a:solidFill>
+                  <a:schemeClr val="accent1"/>
+                </a:solidFill>
+              </a14:hiddenFill>
+            </a:ext>
+            <a:ext uri="{91240B29-F687-4F45-9708-019B960494DF}">
+              <a14:hiddenLine xmlns:a14="http://schemas.microsoft.com/office/drawing/2010/main" w="9525">
+                <a:solidFill>
+                  <a:schemeClr val="tx1"/>
+                </a:solidFill>
+                <a:miter lim="800000"/>
+                <a:headEnd/>
+                <a:tailEnd/>
+              </a14:hiddenLine>
+            </a:ext>
+            <a:ext uri="{AF507438-7753-43E0-B8FC-AC1667EBCBE1}">
+              <a14:hiddenEffects xmlns:a14="http://schemas.microsoft.com/office/drawing/2010/main">
+                <a:effectLst>
+                  <a:outerShdw dist="35921" dir="2700000" algn="ctr" rotWithShape="0">
+                    <a:schemeClr val="bg2"/>
+                  </a:outerShdw>
+                </a:effectLst>
+              </a14:hiddenEffects>
+            </a:ext>
+          </a:extLst>
+        </p:spPr>
+        <p:txBody>
+          <a:bodyPr vert="horz" wrap="square" lIns="238050" tIns="0" rIns="0" bIns="238050" numCol="1" anchor="ctr" anchorCtr="0" compatLnSpc="1">
+            <a:prstTxWarp prst="textNoShape">
+              <a:avLst/>
+            </a:prstTxWarp>
+            <a:spAutoFit/>
+          </a:bodyPr>
+          <a:lstStyle/>
+          <a:p>
+            <a:pPr marL="0" marR="0" lvl="0" indent="0" algn="l" defTabSz="914400" rtl="0" eaLnBrk="0" fontAlgn="base" latinLnBrk="0" hangingPunct="0">
+              <a:lnSpc>
+                <a:spcPct val="150000"/>
+              </a:lnSpc>
+              <a:spcBef>
+                <a:spcPct val="0"/>
+              </a:spcBef>
+              <a:spcAft>
+                <a:spcPct val="0"/>
+              </a:spcAft>
+              <a:buClrTx/>
+              <a:buSzTx/>
+              <a:buFontTx/>
+              <a:buAutoNum type="arabicPeriod"/>
+              <a:tabLst/>
+            </a:pPr>
+            <a:r>
+              <a:rPr kumimoji="0" lang="zh-CN" altLang="zh-CN" sz="1800" b="0" i="0" u="none" strike="noStrike" cap="none" normalizeH="0" baseline="0" dirty="0">
+                <a:ln>
+                  <a:noFill/>
+                </a:ln>
+                <a:solidFill>
+                  <a:srgbClr val="065588"/>
+                </a:solidFill>
+                <a:effectLst/>
+                <a:latin typeface="Times New Roman" panose="02020603050405020304" pitchFamily="18" charset="0"/>
+                <a:ea typeface="+mj-ea"/>
+                <a:cs typeface="Times New Roman" panose="02020603050405020304" pitchFamily="18" charset="0"/>
+                <a:hlinkClick r:id="rId3"/>
+              </a:rPr>
+              <a:t>Stochastic_Sparse_Subspace_Clustering - thecvf.com</a:t>
+            </a:r>
+            <a:endParaRPr kumimoji="0" lang="zh-CN" altLang="zh-CN" sz="1800" b="0" i="0" u="none" strike="noStrike" cap="none" normalizeH="0" baseline="0" dirty="0">
+              <a:ln>
+                <a:noFill/>
+              </a:ln>
+              <a:solidFill>
+                <a:srgbClr val="1F0909"/>
+              </a:solidFill>
+              <a:effectLst/>
+              <a:latin typeface="Times New Roman" panose="02020603050405020304" pitchFamily="18" charset="0"/>
+              <a:ea typeface="+mj-ea"/>
+              <a:cs typeface="Times New Roman" panose="02020603050405020304" pitchFamily="18" charset="0"/>
+            </a:endParaRPr>
+          </a:p>
+          <a:p>
+            <a:pPr marL="0" marR="0" lvl="0" indent="0" algn="l" defTabSz="914400" rtl="0" eaLnBrk="0" fontAlgn="base" latinLnBrk="0" hangingPunct="0">
+              <a:lnSpc>
+                <a:spcPct val="150000"/>
+              </a:lnSpc>
+              <a:spcBef>
+                <a:spcPct val="0"/>
+              </a:spcBef>
+              <a:spcAft>
+                <a:spcPct val="0"/>
+              </a:spcAft>
+              <a:buClrTx/>
+              <a:buSzTx/>
+              <a:buFontTx/>
+              <a:buAutoNum type="arabicPeriod" startAt="2"/>
+              <a:tabLst/>
+            </a:pPr>
+            <a:r>
+              <a:rPr kumimoji="0" lang="zh-CN" altLang="zh-CN" sz="1800" b="0" i="0" u="none" strike="noStrike" cap="none" normalizeH="0" baseline="0" dirty="0">
+                <a:ln>
+                  <a:noFill/>
+                </a:ln>
+                <a:solidFill>
+                  <a:srgbClr val="065588"/>
+                </a:solidFill>
+                <a:effectLst/>
+                <a:latin typeface="Times New Roman" panose="02020603050405020304" pitchFamily="18" charset="0"/>
+                <a:ea typeface="+mj-ea"/>
+                <a:cs typeface="Times New Roman" panose="02020603050405020304" pitchFamily="18" charset="0"/>
+                <a:hlinkClick r:id="rId4"/>
+              </a:rPr>
+              <a:t>CVPR2020 MSAR报告分享 Stochastic Sparse Subspace Clustering 李春光_bilibili</a:t>
+            </a:r>
+            <a:endParaRPr kumimoji="0" lang="zh-CN" altLang="zh-CN" sz="1800" b="0" i="0" u="none" strike="noStrike" cap="none" normalizeH="0" baseline="0" dirty="0">
+              <a:ln>
+                <a:noFill/>
+              </a:ln>
+              <a:solidFill>
+                <a:srgbClr val="1F0909"/>
+              </a:solidFill>
+              <a:effectLst/>
+              <a:latin typeface="Times New Roman" panose="02020603050405020304" pitchFamily="18" charset="0"/>
+              <a:ea typeface="+mj-ea"/>
+              <a:cs typeface="Times New Roman" panose="02020603050405020304" pitchFamily="18" charset="0"/>
+            </a:endParaRPr>
+          </a:p>
+          <a:p>
+            <a:pPr marL="0" marR="0" lvl="0" indent="0" algn="l" defTabSz="914400" rtl="0" eaLnBrk="0" fontAlgn="base" latinLnBrk="0" hangingPunct="0">
+              <a:lnSpc>
+                <a:spcPct val="150000"/>
+              </a:lnSpc>
+              <a:spcBef>
+                <a:spcPct val="0"/>
+              </a:spcBef>
+              <a:spcAft>
+                <a:spcPct val="0"/>
+              </a:spcAft>
+              <a:buClrTx/>
+              <a:buSzTx/>
+              <a:buFontTx/>
+              <a:buAutoNum type="arabicPeriod" startAt="3"/>
+              <a:tabLst/>
+            </a:pPr>
+            <a:r>
+              <a:rPr kumimoji="0" lang="zh-CN" altLang="zh-CN" sz="1800" b="0" i="0" u="none" strike="noStrike" cap="none" normalizeH="0" baseline="0" dirty="0">
+                <a:ln>
+                  <a:noFill/>
+                </a:ln>
+                <a:solidFill>
+                  <a:srgbClr val="065588"/>
+                </a:solidFill>
+                <a:effectLst/>
+                <a:latin typeface="Times New Roman" panose="02020603050405020304" pitchFamily="18" charset="0"/>
+                <a:ea typeface="+mj-ea"/>
+                <a:cs typeface="Times New Roman" panose="02020603050405020304" pitchFamily="18" charset="0"/>
+                <a:hlinkClick r:id="rId5"/>
+              </a:rPr>
+              <a:t>王晨朔，稀疏自表示子空间聚类+后续改进</a:t>
+            </a:r>
+            <a:endParaRPr kumimoji="0" lang="zh-CN" altLang="zh-CN" sz="1800" b="0" i="0" u="none" strike="noStrike" cap="none" normalizeH="0" baseline="0" dirty="0">
+              <a:ln>
+                <a:noFill/>
+              </a:ln>
+              <a:solidFill>
+                <a:srgbClr val="1F0909"/>
+              </a:solidFill>
+              <a:effectLst/>
+              <a:latin typeface="Times New Roman" panose="02020603050405020304" pitchFamily="18" charset="0"/>
+              <a:ea typeface="+mj-ea"/>
+              <a:cs typeface="Times New Roman" panose="02020603050405020304" pitchFamily="18" charset="0"/>
+            </a:endParaRPr>
+          </a:p>
+          <a:p>
+            <a:pPr marL="0" marR="0" lvl="0" indent="0" algn="l" defTabSz="914400" rtl="0" eaLnBrk="0" fontAlgn="base" latinLnBrk="0" hangingPunct="0">
+              <a:lnSpc>
+                <a:spcPct val="150000"/>
+              </a:lnSpc>
+              <a:spcBef>
+                <a:spcPct val="0"/>
+              </a:spcBef>
+              <a:spcAft>
+                <a:spcPct val="0"/>
+              </a:spcAft>
+              <a:buClrTx/>
+              <a:buSzTx/>
+              <a:buFontTx/>
+              <a:buAutoNum type="arabicPeriod" startAt="4"/>
+              <a:tabLst/>
+            </a:pPr>
+            <a:r>
+              <a:rPr kumimoji="0" lang="zh-CN" altLang="zh-CN" sz="1800" b="0" i="0" u="none" strike="noStrike" cap="none" normalizeH="0" baseline="0" dirty="0">
+                <a:ln>
+                  <a:noFill/>
+                </a:ln>
+                <a:solidFill>
+                  <a:srgbClr val="065588"/>
+                </a:solidFill>
+                <a:effectLst/>
+                <a:latin typeface="Times New Roman" panose="02020603050405020304" pitchFamily="18" charset="0"/>
+                <a:ea typeface="+mj-ea"/>
+                <a:cs typeface="Times New Roman" panose="02020603050405020304" pitchFamily="18" charset="0"/>
+                <a:hlinkClick r:id="rId6"/>
+              </a:rPr>
+              <a:t>Xijun (Ted) Li， 漫谈高维数据聚类(2):子空间聚类</a:t>
+            </a:r>
+            <a:endParaRPr kumimoji="0" lang="zh-CN" altLang="zh-CN" sz="1800" b="0" i="0" u="none" strike="noStrike" cap="none" normalizeH="0" baseline="0" dirty="0">
+              <a:ln>
+                <a:noFill/>
+              </a:ln>
+              <a:solidFill>
+                <a:srgbClr val="1F0909"/>
+              </a:solidFill>
+              <a:effectLst/>
+              <a:latin typeface="Times New Roman" panose="02020603050405020304" pitchFamily="18" charset="0"/>
+              <a:ea typeface="+mj-ea"/>
+              <a:cs typeface="Times New Roman" panose="02020603050405020304" pitchFamily="18" charset="0"/>
+            </a:endParaRPr>
+          </a:p>
+          <a:p>
+            <a:pPr marL="0" marR="0" lvl="0" indent="0" algn="l" defTabSz="914400" rtl="0" eaLnBrk="0" fontAlgn="base" latinLnBrk="0" hangingPunct="0">
+              <a:lnSpc>
+                <a:spcPct val="150000"/>
+              </a:lnSpc>
+              <a:spcBef>
+                <a:spcPct val="0"/>
+              </a:spcBef>
+              <a:spcAft>
+                <a:spcPct val="0"/>
+              </a:spcAft>
+              <a:buClrTx/>
+              <a:buSzTx/>
+              <a:buFontTx/>
+              <a:buAutoNum type="arabicPeriod" startAt="5"/>
+              <a:tabLst/>
+            </a:pPr>
+            <a:r>
+              <a:rPr kumimoji="0" lang="zh-CN" altLang="zh-CN" sz="1800" b="0" i="0" u="none" strike="noStrike" cap="none" normalizeH="0" baseline="0" dirty="0">
+                <a:ln>
+                  <a:noFill/>
+                </a:ln>
+                <a:solidFill>
+                  <a:srgbClr val="065588"/>
+                </a:solidFill>
+                <a:effectLst/>
+                <a:latin typeface="Times New Roman" panose="02020603050405020304" pitchFamily="18" charset="0"/>
+                <a:ea typeface="+mj-ea"/>
+                <a:cs typeface="Times New Roman" panose="02020603050405020304" pitchFamily="18" charset="0"/>
+                <a:hlinkClick r:id="rId7"/>
+              </a:rPr>
+              <a:t>多角度理解正则项 - 知乎</a:t>
+            </a:r>
+            <a:endParaRPr kumimoji="0" lang="zh-CN" altLang="zh-CN" sz="1800" b="0" i="0" u="none" strike="noStrike" cap="none" normalizeH="0" baseline="0" dirty="0">
+              <a:ln>
+                <a:noFill/>
+              </a:ln>
+              <a:solidFill>
+                <a:srgbClr val="1F0909"/>
+              </a:solidFill>
+              <a:effectLst/>
+              <a:latin typeface="Times New Roman" panose="02020603050405020304" pitchFamily="18" charset="0"/>
+              <a:ea typeface="+mj-ea"/>
+              <a:cs typeface="Times New Roman" panose="02020603050405020304" pitchFamily="18" charset="0"/>
+            </a:endParaRPr>
+          </a:p>
+          <a:p>
+            <a:pPr marL="0" marR="0" lvl="0" indent="0" algn="l" defTabSz="914400" rtl="0" eaLnBrk="0" fontAlgn="base" latinLnBrk="0" hangingPunct="0">
+              <a:lnSpc>
+                <a:spcPct val="150000"/>
+              </a:lnSpc>
+              <a:spcBef>
+                <a:spcPct val="0"/>
+              </a:spcBef>
+              <a:spcAft>
+                <a:spcPct val="0"/>
+              </a:spcAft>
+              <a:buClrTx/>
+              <a:buSzTx/>
+              <a:buFontTx/>
+              <a:buAutoNum type="arabicPeriod" startAt="6"/>
+              <a:tabLst/>
+            </a:pPr>
+            <a:r>
+              <a:rPr kumimoji="0" lang="zh-CN" altLang="zh-CN" sz="1800" b="0" i="0" u="none" strike="noStrike" cap="none" normalizeH="0" baseline="0" dirty="0">
+                <a:ln>
+                  <a:noFill/>
+                </a:ln>
+                <a:solidFill>
+                  <a:srgbClr val="065588"/>
+                </a:solidFill>
+                <a:effectLst/>
+                <a:latin typeface="Times New Roman" panose="02020603050405020304" pitchFamily="18" charset="0"/>
+                <a:ea typeface="+mj-ea"/>
+                <a:cs typeface="Times New Roman" panose="02020603050405020304" pitchFamily="18" charset="0"/>
+                <a:hlinkClick r:id="rId8"/>
+              </a:rPr>
+              <a:t>如何通俗易懂地解释「范数」？ - 知乎</a:t>
+            </a:r>
+            <a:endParaRPr kumimoji="0" lang="zh-CN" altLang="zh-CN" sz="1800" b="0" i="0" u="none" strike="noStrike" cap="none" normalizeH="0" baseline="0" dirty="0">
+              <a:ln>
+                <a:noFill/>
+              </a:ln>
+              <a:solidFill>
+                <a:srgbClr val="1F0909"/>
+              </a:solidFill>
+              <a:effectLst/>
+              <a:latin typeface="Times New Roman" panose="02020603050405020304" pitchFamily="18" charset="0"/>
+              <a:ea typeface="+mj-ea"/>
+              <a:cs typeface="Times New Roman" panose="02020603050405020304" pitchFamily="18" charset="0"/>
+            </a:endParaRPr>
+          </a:p>
+          <a:p>
+            <a:pPr marL="0" marR="0" lvl="0" indent="0" algn="l" defTabSz="914400" rtl="0" eaLnBrk="0" fontAlgn="base" latinLnBrk="0" hangingPunct="0">
+              <a:lnSpc>
+                <a:spcPct val="150000"/>
+              </a:lnSpc>
+              <a:spcBef>
+                <a:spcPct val="0"/>
+              </a:spcBef>
+              <a:spcAft>
+                <a:spcPct val="0"/>
+              </a:spcAft>
+              <a:buClrTx/>
+              <a:buSzTx/>
+              <a:buFontTx/>
+              <a:buAutoNum type="arabicPeriod" startAt="7"/>
+              <a:tabLst/>
+            </a:pPr>
+            <a:r>
+              <a:rPr kumimoji="0" lang="zh-CN" altLang="zh-CN" sz="1800" b="0" i="0" u="none" strike="noStrike" cap="none" normalizeH="0" baseline="0" dirty="0">
+                <a:ln>
+                  <a:noFill/>
+                </a:ln>
+                <a:solidFill>
+                  <a:srgbClr val="065588"/>
+                </a:solidFill>
+                <a:effectLst/>
+                <a:latin typeface="Times New Roman" panose="02020603050405020304" pitchFamily="18" charset="0"/>
+                <a:ea typeface="+mj-ea"/>
+                <a:cs typeface="Times New Roman" panose="02020603050405020304" pitchFamily="18" charset="0"/>
+                <a:hlinkClick r:id="rId9"/>
+              </a:rPr>
+              <a:t>谱聚类原理 - Machine Learning (gitbooks.io)</a:t>
+            </a:r>
+            <a:endParaRPr kumimoji="0" lang="zh-CN" altLang="zh-CN" sz="1800" b="0" i="0" u="none" strike="noStrike" cap="none" normalizeH="0" baseline="0" dirty="0">
+              <a:ln>
+                <a:noFill/>
+              </a:ln>
+              <a:solidFill>
+                <a:srgbClr val="1F0909"/>
+              </a:solidFill>
+              <a:effectLst/>
+              <a:latin typeface="Times New Roman" panose="02020603050405020304" pitchFamily="18" charset="0"/>
+              <a:ea typeface="+mj-ea"/>
+              <a:cs typeface="Times New Roman" panose="02020603050405020304" pitchFamily="18" charset="0"/>
+            </a:endParaRPr>
+          </a:p>
+          <a:p>
+            <a:pPr marL="0" marR="0" lvl="0" indent="0" algn="l" defTabSz="914400" rtl="0" eaLnBrk="0" fontAlgn="base" latinLnBrk="0" hangingPunct="0">
+              <a:lnSpc>
+                <a:spcPct val="150000"/>
+              </a:lnSpc>
+              <a:spcBef>
+                <a:spcPct val="0"/>
+              </a:spcBef>
+              <a:spcAft>
+                <a:spcPct val="0"/>
+              </a:spcAft>
+              <a:buClrTx/>
+              <a:buSzTx/>
+              <a:buFontTx/>
+              <a:buAutoNum type="arabicPeriod" startAt="8"/>
+              <a:tabLst/>
+            </a:pPr>
+            <a:r>
+              <a:rPr kumimoji="0" lang="zh-CN" altLang="zh-CN" sz="1800" b="0" i="0" u="none" strike="noStrike" cap="none" normalizeH="0" baseline="0" dirty="0">
+                <a:ln>
+                  <a:noFill/>
+                </a:ln>
+                <a:solidFill>
+                  <a:srgbClr val="065588"/>
+                </a:solidFill>
+                <a:effectLst/>
+                <a:latin typeface="Times New Roman" panose="02020603050405020304" pitchFamily="18" charset="0"/>
+                <a:ea typeface="+mj-ea"/>
+                <a:cs typeface="Times New Roman" panose="02020603050405020304" pitchFamily="18" charset="0"/>
+                <a:hlinkClick r:id="rId10"/>
+              </a:rPr>
+              <a:t>伯努利分布 - 百度百科</a:t>
+            </a:r>
+            <a:endParaRPr kumimoji="0" lang="zh-CN" altLang="zh-CN" sz="1800" b="0" i="0" u="none" strike="noStrike" cap="none" normalizeH="0" baseline="0" dirty="0">
+              <a:ln>
+                <a:noFill/>
+              </a:ln>
+              <a:solidFill>
+                <a:srgbClr val="1F0909"/>
+              </a:solidFill>
+              <a:effectLst/>
+              <a:latin typeface="Times New Roman" panose="02020603050405020304" pitchFamily="18" charset="0"/>
+              <a:ea typeface="+mj-ea"/>
+              <a:cs typeface="Times New Roman" panose="02020603050405020304" pitchFamily="18" charset="0"/>
+            </a:endParaRPr>
+          </a:p>
+          <a:p>
+            <a:pPr marL="0" marR="0" lvl="0" indent="0" algn="l" defTabSz="914400" rtl="0" eaLnBrk="0" fontAlgn="base" latinLnBrk="0" hangingPunct="0">
+              <a:lnSpc>
+                <a:spcPct val="150000"/>
+              </a:lnSpc>
+              <a:spcBef>
+                <a:spcPct val="0"/>
+              </a:spcBef>
+              <a:spcAft>
+                <a:spcPct val="0"/>
+              </a:spcAft>
+              <a:buClrTx/>
+              <a:buSzTx/>
+              <a:buFontTx/>
+              <a:buAutoNum type="arabicPeriod" startAt="9"/>
+              <a:tabLst/>
+            </a:pPr>
+            <a:r>
+              <a:rPr kumimoji="0" lang="zh-CN" altLang="zh-CN" sz="1800" b="0" i="0" u="none" strike="noStrike" cap="none" normalizeH="0" baseline="0" dirty="0">
+                <a:ln>
+                  <a:noFill/>
+                </a:ln>
+                <a:solidFill>
+                  <a:srgbClr val="065588"/>
+                </a:solidFill>
+                <a:effectLst/>
+                <a:latin typeface="Times New Roman" panose="02020603050405020304" pitchFamily="18" charset="0"/>
+                <a:ea typeface="+mj-ea"/>
+                <a:cs typeface="Times New Roman" panose="02020603050405020304" pitchFamily="18" charset="0"/>
+                <a:hlinkClick r:id="rId11"/>
+              </a:rPr>
+              <a:t>正交匹配追踪算法 - CSDN</a:t>
+            </a:r>
+            <a:endParaRPr kumimoji="0" lang="zh-CN" altLang="zh-CN" sz="1800" b="0" i="0" u="none" strike="noStrike" cap="none" normalizeH="0" baseline="0" dirty="0">
+              <a:ln>
+                <a:noFill/>
+              </a:ln>
+              <a:solidFill>
+                <a:srgbClr val="1F0909"/>
+              </a:solidFill>
+              <a:effectLst/>
+              <a:latin typeface="Times New Roman" panose="02020603050405020304" pitchFamily="18" charset="0"/>
+              <a:ea typeface="+mj-ea"/>
+              <a:cs typeface="Times New Roman" panose="02020603050405020304" pitchFamily="18" charset="0"/>
+            </a:endParaRPr>
+          </a:p>
+          <a:p>
+            <a:pPr marL="0" marR="0" lvl="0" indent="0" algn="l" defTabSz="914400" rtl="0" eaLnBrk="0" fontAlgn="base" latinLnBrk="0" hangingPunct="0">
+              <a:lnSpc>
+                <a:spcPct val="150000"/>
+              </a:lnSpc>
+              <a:spcBef>
+                <a:spcPct val="0"/>
+              </a:spcBef>
+              <a:spcAft>
+                <a:spcPct val="0"/>
+              </a:spcAft>
+              <a:buClrTx/>
+              <a:buSzTx/>
+              <a:buFontTx/>
+              <a:buAutoNum type="arabicPeriod" startAt="10"/>
+              <a:tabLst/>
+            </a:pPr>
+            <a:r>
+              <a:rPr kumimoji="0" lang="zh-CN" altLang="zh-CN" sz="1800" b="0" i="0" u="none" strike="noStrike" cap="none" normalizeH="0" baseline="0" dirty="0">
+                <a:ln>
+                  <a:noFill/>
+                </a:ln>
+                <a:solidFill>
+                  <a:srgbClr val="065588"/>
+                </a:solidFill>
+                <a:effectLst/>
+                <a:latin typeface="Times New Roman" panose="02020603050405020304" pitchFamily="18" charset="0"/>
+                <a:ea typeface="+mj-ea"/>
+                <a:cs typeface="Times New Roman" panose="02020603050405020304" pitchFamily="18" charset="0"/>
+                <a:hlinkClick r:id="rId12"/>
+              </a:rPr>
+              <a:t>Orthogonal matching pursuit: recursive function approximation with applications to wavelet decomposi - Signals</a:t>
+            </a:r>
+            <a:endParaRPr kumimoji="0" lang="zh-CN" altLang="zh-CN" sz="1800" b="0" i="0" u="none" strike="noStrike" cap="none" normalizeH="0" baseline="0" dirty="0">
+              <a:ln>
+                <a:noFill/>
+              </a:ln>
+              <a:solidFill>
+                <a:schemeClr val="tx1"/>
+              </a:solidFill>
+              <a:effectLst/>
+              <a:latin typeface="Times New Roman" panose="02020603050405020304" pitchFamily="18" charset="0"/>
+              <a:ea typeface="+mj-ea"/>
+              <a:cs typeface="Times New Roman" panose="02020603050405020304" pitchFamily="18" charset="0"/>
+            </a:endParaRPr>
+          </a:p>
+        </p:txBody>
+      </p:sp>
       <p:sp>
         <p:nvSpPr>
           <p:cNvPr id="2" name="标题 1">
@@ -17734,605 +18367,17 @@
           <a:p>
             <a:pPr algn="ctr"/>
             <a:r>
-              <a:rPr lang="en-US" altLang="zh-CN" sz="3200" dirty="0"/>
+              <a:rPr lang="en-US" altLang="zh-CN" sz="3600" dirty="0"/>
               <a:t>Thank you </a:t>
             </a:r>
             <a:br>
-              <a:rPr lang="en-US" altLang="zh-CN" sz="3200" dirty="0"/>
+              <a:rPr lang="en-US" altLang="zh-CN" sz="3600" dirty="0"/>
             </a:br>
             <a:r>
-              <a:rPr lang="en-US" altLang="zh-CN" sz="3200" dirty="0"/>
+              <a:rPr lang="en-US" altLang="zh-CN" sz="3600" dirty="0"/>
               <a:t>for your listening!</a:t>
             </a:r>
-            <a:endParaRPr lang="zh-CN" altLang="en-US" sz="3200" dirty="0"/>
-          </a:p>
-        </p:txBody>
-      </p:sp>
-      <p:sp>
-        <p:nvSpPr>
-          <p:cNvPr id="6" name="Rectangle 2">
-            <a:extLst>
-              <a:ext uri="{FF2B5EF4-FFF2-40B4-BE49-F238E27FC236}">
-                <a16:creationId xmlns:a16="http://schemas.microsoft.com/office/drawing/2014/main" id="{AA6A9488-9A7D-40CE-9E27-727FB215E494}"/>
-              </a:ext>
-            </a:extLst>
-          </p:cNvPr>
-          <p:cNvSpPr>
-            <a:spLocks noGrp="1" noChangeArrowheads="1"/>
-          </p:cNvSpPr>
-          <p:nvPr>
-            <p:ph idx="1"/>
-          </p:nvPr>
-        </p:nvSpPr>
-        <p:spPr bwMode="auto">
-          <a:xfrm>
-            <a:off x="689486" y="1027906"/>
-            <a:ext cx="10813027" cy="5918852"/>
-          </a:xfrm>
-          <a:prstGeom prst="rect">
-            <a:avLst/>
-          </a:prstGeom>
-          <a:noFill/>
-          <a:ln>
-            <a:noFill/>
-          </a:ln>
-          <a:effectLst/>
-          <a:extLst>
-            <a:ext uri="{909E8E84-426E-40DD-AFC4-6F175D3DCCD1}">
-              <a14:hiddenFill xmlns:a14="http://schemas.microsoft.com/office/drawing/2010/main">
-                <a:solidFill>
-                  <a:schemeClr val="accent1"/>
-                </a:solidFill>
-              </a14:hiddenFill>
-            </a:ext>
-            <a:ext uri="{91240B29-F687-4F45-9708-019B960494DF}">
-              <a14:hiddenLine xmlns:a14="http://schemas.microsoft.com/office/drawing/2010/main" w="9525">
-                <a:solidFill>
-                  <a:schemeClr val="tx1"/>
-                </a:solidFill>
-                <a:miter lim="800000"/>
-                <a:headEnd/>
-                <a:tailEnd/>
-              </a14:hiddenLine>
-            </a:ext>
-            <a:ext uri="{AF507438-7753-43E0-B8FC-AC1667EBCBE1}">
-              <a14:hiddenEffects xmlns:a14="http://schemas.microsoft.com/office/drawing/2010/main">
-                <a:effectLst>
-                  <a:outerShdw dist="35921" dir="2700000" algn="ctr" rotWithShape="0">
-                    <a:schemeClr val="bg2"/>
-                  </a:outerShdw>
-                </a:effectLst>
-              </a14:hiddenEffects>
-            </a:ext>
-          </a:extLst>
-        </p:spPr>
-        <p:txBody>
-          <a:bodyPr vert="horz" wrap="square" lIns="238050" tIns="0" rIns="0" bIns="238050" numCol="1" anchor="ctr" anchorCtr="0" compatLnSpc="1">
-            <a:prstTxWarp prst="textNoShape">
-              <a:avLst/>
-            </a:prstTxWarp>
-            <a:spAutoFit/>
-          </a:bodyPr>
-          <a:lstStyle/>
-          <a:p>
-            <a:pPr marL="0" marR="0" lvl="0" indent="0" algn="l" defTabSz="914400" rtl="0" eaLnBrk="0" fontAlgn="base" latinLnBrk="0" hangingPunct="0">
-              <a:lnSpc>
-                <a:spcPct val="150000"/>
-              </a:lnSpc>
-              <a:spcBef>
-                <a:spcPct val="0"/>
-              </a:spcBef>
-              <a:spcAft>
-                <a:spcPct val="0"/>
-              </a:spcAft>
-              <a:buClrTx/>
-              <a:buSzTx/>
-              <a:buFontTx/>
-              <a:buNone/>
-              <a:tabLst/>
-            </a:pPr>
-            <a:endParaRPr kumimoji="0" lang="zh-CN" altLang="zh-CN" sz="1800" b="0" i="0" u="none" strike="noStrike" cap="none" normalizeH="0" baseline="0" dirty="0">
-              <a:ln>
-                <a:noFill/>
-              </a:ln>
-              <a:solidFill>
-                <a:schemeClr val="tx1"/>
-              </a:solidFill>
-              <a:effectLst/>
-              <a:latin typeface="Times New Roman" panose="02020603050405020304" pitchFamily="18" charset="0"/>
-              <a:ea typeface="+mj-ea"/>
-              <a:cs typeface="Times New Roman" panose="02020603050405020304" pitchFamily="18" charset="0"/>
-            </a:endParaRPr>
-          </a:p>
-          <a:p>
-            <a:pPr marL="0" marR="0" lvl="0" indent="0" algn="l" defTabSz="914400" rtl="0" eaLnBrk="0" fontAlgn="base" latinLnBrk="0" hangingPunct="0">
-              <a:lnSpc>
-                <a:spcPct val="150000"/>
-              </a:lnSpc>
-              <a:spcBef>
-                <a:spcPct val="0"/>
-              </a:spcBef>
-              <a:spcAft>
-                <a:spcPct val="0"/>
-              </a:spcAft>
-              <a:buClrTx/>
-              <a:buSzTx/>
-              <a:buFontTx/>
-              <a:buAutoNum type="arabicPeriod"/>
-              <a:tabLst/>
-            </a:pPr>
-            <a:r>
-              <a:rPr kumimoji="0" lang="zh-CN" altLang="zh-CN" sz="1800" b="0" i="0" u="none" strike="noStrike" cap="none" normalizeH="0" baseline="0" dirty="0">
-                <a:ln>
-                  <a:noFill/>
-                </a:ln>
-                <a:solidFill>
-                  <a:srgbClr val="065588"/>
-                </a:solidFill>
-                <a:effectLst/>
-                <a:latin typeface="Times New Roman" panose="02020603050405020304" pitchFamily="18" charset="0"/>
-                <a:ea typeface="+mj-ea"/>
-                <a:cs typeface="Times New Roman" panose="02020603050405020304" pitchFamily="18" charset="0"/>
-                <a:hlinkClick r:id="rId3"/>
-              </a:rPr>
-              <a:t>Stochastic_Sparse_Subspace_Clustering - thecvf.com</a:t>
-            </a:r>
-            <a:endParaRPr kumimoji="0" lang="zh-CN" altLang="zh-CN" sz="1800" b="0" i="0" u="none" strike="noStrike" cap="none" normalizeH="0" baseline="0" dirty="0">
-              <a:ln>
-                <a:noFill/>
-              </a:ln>
-              <a:solidFill>
-                <a:srgbClr val="1F0909"/>
-              </a:solidFill>
-              <a:effectLst/>
-              <a:latin typeface="Times New Roman" panose="02020603050405020304" pitchFamily="18" charset="0"/>
-              <a:ea typeface="+mj-ea"/>
-              <a:cs typeface="Times New Roman" panose="02020603050405020304" pitchFamily="18" charset="0"/>
-            </a:endParaRPr>
-          </a:p>
-          <a:p>
-            <a:pPr marL="0" marR="0" lvl="0" indent="0" algn="l" defTabSz="914400" rtl="0" eaLnBrk="0" fontAlgn="base" latinLnBrk="0" hangingPunct="0">
-              <a:lnSpc>
-                <a:spcPct val="150000"/>
-              </a:lnSpc>
-              <a:spcBef>
-                <a:spcPct val="0"/>
-              </a:spcBef>
-              <a:spcAft>
-                <a:spcPct val="0"/>
-              </a:spcAft>
-              <a:buClrTx/>
-              <a:buSzTx/>
-              <a:buFontTx/>
-              <a:buAutoNum type="arabicPeriod" startAt="2"/>
-              <a:tabLst/>
-            </a:pPr>
-            <a:r>
-              <a:rPr kumimoji="0" lang="zh-CN" altLang="zh-CN" sz="1800" b="0" i="0" u="none" strike="noStrike" cap="none" normalizeH="0" baseline="0" dirty="0">
-                <a:ln>
-                  <a:noFill/>
-                </a:ln>
-                <a:solidFill>
-                  <a:srgbClr val="065588"/>
-                </a:solidFill>
-                <a:effectLst/>
-                <a:latin typeface="Times New Roman" panose="02020603050405020304" pitchFamily="18" charset="0"/>
-                <a:ea typeface="+mj-ea"/>
-                <a:cs typeface="Times New Roman" panose="02020603050405020304" pitchFamily="18" charset="0"/>
-                <a:hlinkClick r:id="rId4"/>
-              </a:rPr>
-              <a:t>CVPR2020 MSAR报告分享 Stochastic Sparse Subspace Clustering 李春光_bilibili</a:t>
-            </a:r>
-            <a:endParaRPr kumimoji="0" lang="zh-CN" altLang="zh-CN" sz="1800" b="0" i="0" u="none" strike="noStrike" cap="none" normalizeH="0" baseline="0" dirty="0">
-              <a:ln>
-                <a:noFill/>
-              </a:ln>
-              <a:solidFill>
-                <a:srgbClr val="1F0909"/>
-              </a:solidFill>
-              <a:effectLst/>
-              <a:latin typeface="Times New Roman" panose="02020603050405020304" pitchFamily="18" charset="0"/>
-              <a:ea typeface="+mj-ea"/>
-              <a:cs typeface="Times New Roman" panose="02020603050405020304" pitchFamily="18" charset="0"/>
-            </a:endParaRPr>
-          </a:p>
-          <a:p>
-            <a:pPr marL="0" marR="0" lvl="0" indent="0" algn="l" defTabSz="914400" rtl="0" eaLnBrk="0" fontAlgn="base" latinLnBrk="0" hangingPunct="0">
-              <a:lnSpc>
-                <a:spcPct val="150000"/>
-              </a:lnSpc>
-              <a:spcBef>
-                <a:spcPct val="0"/>
-              </a:spcBef>
-              <a:spcAft>
-                <a:spcPct val="0"/>
-              </a:spcAft>
-              <a:buClrTx/>
-              <a:buSzTx/>
-              <a:buFontTx/>
-              <a:buAutoNum type="arabicPeriod" startAt="3"/>
-              <a:tabLst/>
-            </a:pPr>
-            <a:r>
-              <a:rPr kumimoji="0" lang="zh-CN" altLang="zh-CN" sz="1800" b="0" i="0" u="none" strike="noStrike" cap="none" normalizeH="0" baseline="0" dirty="0">
-                <a:ln>
-                  <a:noFill/>
-                </a:ln>
-                <a:solidFill>
-                  <a:srgbClr val="065588"/>
-                </a:solidFill>
-                <a:effectLst/>
-                <a:latin typeface="Times New Roman" panose="02020603050405020304" pitchFamily="18" charset="0"/>
-                <a:ea typeface="+mj-ea"/>
-                <a:cs typeface="Times New Roman" panose="02020603050405020304" pitchFamily="18" charset="0"/>
-                <a:hlinkClick r:id="rId5"/>
-              </a:rPr>
-              <a:t>王晨朔，稀疏自表示子空间聚类+后续改进</a:t>
-            </a:r>
-            <a:endParaRPr kumimoji="0" lang="zh-CN" altLang="zh-CN" sz="1800" b="0" i="0" u="none" strike="noStrike" cap="none" normalizeH="0" baseline="0" dirty="0">
-              <a:ln>
-                <a:noFill/>
-              </a:ln>
-              <a:solidFill>
-                <a:srgbClr val="1F0909"/>
-              </a:solidFill>
-              <a:effectLst/>
-              <a:latin typeface="Times New Roman" panose="02020603050405020304" pitchFamily="18" charset="0"/>
-              <a:ea typeface="+mj-ea"/>
-              <a:cs typeface="Times New Roman" panose="02020603050405020304" pitchFamily="18" charset="0"/>
-            </a:endParaRPr>
-          </a:p>
-          <a:p>
-            <a:pPr marL="0" marR="0" lvl="0" indent="0" algn="l" defTabSz="914400" rtl="0" eaLnBrk="0" fontAlgn="base" latinLnBrk="0" hangingPunct="0">
-              <a:lnSpc>
-                <a:spcPct val="150000"/>
-              </a:lnSpc>
-              <a:spcBef>
-                <a:spcPct val="0"/>
-              </a:spcBef>
-              <a:spcAft>
-                <a:spcPct val="0"/>
-              </a:spcAft>
-              <a:buClrTx/>
-              <a:buSzTx/>
-              <a:buFontTx/>
-              <a:buAutoNum type="arabicPeriod" startAt="4"/>
-              <a:tabLst/>
-            </a:pPr>
-            <a:r>
-              <a:rPr kumimoji="0" lang="zh-CN" altLang="zh-CN" sz="1800" b="0" i="0" u="none" strike="noStrike" cap="none" normalizeH="0" baseline="0" dirty="0">
-                <a:ln>
-                  <a:noFill/>
-                </a:ln>
-                <a:solidFill>
-                  <a:srgbClr val="065588"/>
-                </a:solidFill>
-                <a:effectLst/>
-                <a:latin typeface="Times New Roman" panose="02020603050405020304" pitchFamily="18" charset="0"/>
-                <a:ea typeface="+mj-ea"/>
-                <a:cs typeface="Times New Roman" panose="02020603050405020304" pitchFamily="18" charset="0"/>
-                <a:hlinkClick r:id="rId6"/>
-              </a:rPr>
-              <a:t>Xijun (Ted) Li， 漫谈高维数据聚类(2):子空间聚类</a:t>
-            </a:r>
-            <a:endParaRPr kumimoji="0" lang="zh-CN" altLang="zh-CN" sz="1800" b="0" i="0" u="none" strike="noStrike" cap="none" normalizeH="0" baseline="0" dirty="0">
-              <a:ln>
-                <a:noFill/>
-              </a:ln>
-              <a:solidFill>
-                <a:srgbClr val="1F0909"/>
-              </a:solidFill>
-              <a:effectLst/>
-              <a:latin typeface="Times New Roman" panose="02020603050405020304" pitchFamily="18" charset="0"/>
-              <a:ea typeface="+mj-ea"/>
-              <a:cs typeface="Times New Roman" panose="02020603050405020304" pitchFamily="18" charset="0"/>
-            </a:endParaRPr>
-          </a:p>
-          <a:p>
-            <a:pPr marL="0" marR="0" lvl="0" indent="0" algn="l" defTabSz="914400" rtl="0" eaLnBrk="0" fontAlgn="base" latinLnBrk="0" hangingPunct="0">
-              <a:lnSpc>
-                <a:spcPct val="150000"/>
-              </a:lnSpc>
-              <a:spcBef>
-                <a:spcPct val="0"/>
-              </a:spcBef>
-              <a:spcAft>
-                <a:spcPct val="0"/>
-              </a:spcAft>
-              <a:buClrTx/>
-              <a:buSzTx/>
-              <a:buFontTx/>
-              <a:buAutoNum type="arabicPeriod" startAt="5"/>
-              <a:tabLst/>
-            </a:pPr>
-            <a:r>
-              <a:rPr kumimoji="0" lang="zh-CN" altLang="zh-CN" sz="1800" b="0" i="0" u="none" strike="noStrike" cap="none" normalizeH="0" baseline="0" dirty="0">
-                <a:ln>
-                  <a:noFill/>
-                </a:ln>
-                <a:solidFill>
-                  <a:srgbClr val="065588"/>
-                </a:solidFill>
-                <a:effectLst/>
-                <a:latin typeface="Times New Roman" panose="02020603050405020304" pitchFamily="18" charset="0"/>
-                <a:ea typeface="+mj-ea"/>
-                <a:cs typeface="Times New Roman" panose="02020603050405020304" pitchFamily="18" charset="0"/>
-                <a:hlinkClick r:id="rId7"/>
-              </a:rPr>
-              <a:t>多角度理解正则项 - 知乎</a:t>
-            </a:r>
-            <a:endParaRPr kumimoji="0" lang="zh-CN" altLang="zh-CN" sz="1800" b="0" i="0" u="none" strike="noStrike" cap="none" normalizeH="0" baseline="0" dirty="0">
-              <a:ln>
-                <a:noFill/>
-              </a:ln>
-              <a:solidFill>
-                <a:srgbClr val="1F0909"/>
-              </a:solidFill>
-              <a:effectLst/>
-              <a:latin typeface="Times New Roman" panose="02020603050405020304" pitchFamily="18" charset="0"/>
-              <a:ea typeface="+mj-ea"/>
-              <a:cs typeface="Times New Roman" panose="02020603050405020304" pitchFamily="18" charset="0"/>
-            </a:endParaRPr>
-          </a:p>
-          <a:p>
-            <a:pPr marL="0" marR="0" lvl="0" indent="0" algn="l" defTabSz="914400" rtl="0" eaLnBrk="0" fontAlgn="base" latinLnBrk="0" hangingPunct="0">
-              <a:lnSpc>
-                <a:spcPct val="150000"/>
-              </a:lnSpc>
-              <a:spcBef>
-                <a:spcPct val="0"/>
-              </a:spcBef>
-              <a:spcAft>
-                <a:spcPct val="0"/>
-              </a:spcAft>
-              <a:buClrTx/>
-              <a:buSzTx/>
-              <a:buFontTx/>
-              <a:buAutoNum type="arabicPeriod" startAt="6"/>
-              <a:tabLst/>
-            </a:pPr>
-            <a:r>
-              <a:rPr kumimoji="0" lang="zh-CN" altLang="zh-CN" sz="1800" b="0" i="0" u="none" strike="noStrike" cap="none" normalizeH="0" baseline="0" dirty="0">
-                <a:ln>
-                  <a:noFill/>
-                </a:ln>
-                <a:solidFill>
-                  <a:srgbClr val="065588"/>
-                </a:solidFill>
-                <a:effectLst/>
-                <a:latin typeface="Times New Roman" panose="02020603050405020304" pitchFamily="18" charset="0"/>
-                <a:ea typeface="+mj-ea"/>
-                <a:cs typeface="Times New Roman" panose="02020603050405020304" pitchFamily="18" charset="0"/>
-                <a:hlinkClick r:id="rId8"/>
-              </a:rPr>
-              <a:t>如何通俗易懂地解释「范数」？ - 知乎</a:t>
-            </a:r>
-            <a:endParaRPr kumimoji="0" lang="zh-CN" altLang="zh-CN" sz="1800" b="0" i="0" u="none" strike="noStrike" cap="none" normalizeH="0" baseline="0" dirty="0">
-              <a:ln>
-                <a:noFill/>
-              </a:ln>
-              <a:solidFill>
-                <a:srgbClr val="1F0909"/>
-              </a:solidFill>
-              <a:effectLst/>
-              <a:latin typeface="Times New Roman" panose="02020603050405020304" pitchFamily="18" charset="0"/>
-              <a:ea typeface="+mj-ea"/>
-              <a:cs typeface="Times New Roman" panose="02020603050405020304" pitchFamily="18" charset="0"/>
-            </a:endParaRPr>
-          </a:p>
-          <a:p>
-            <a:pPr marL="0" marR="0" lvl="0" indent="0" algn="l" defTabSz="914400" rtl="0" eaLnBrk="0" fontAlgn="base" latinLnBrk="0" hangingPunct="0">
-              <a:lnSpc>
-                <a:spcPct val="150000"/>
-              </a:lnSpc>
-              <a:spcBef>
-                <a:spcPct val="0"/>
-              </a:spcBef>
-              <a:spcAft>
-                <a:spcPct val="0"/>
-              </a:spcAft>
-              <a:buClrTx/>
-              <a:buSzTx/>
-              <a:buFontTx/>
-              <a:buAutoNum type="arabicPeriod" startAt="7"/>
-              <a:tabLst/>
-            </a:pPr>
-            <a:r>
-              <a:rPr kumimoji="0" lang="zh-CN" altLang="zh-CN" sz="1800" b="0" i="0" u="none" strike="noStrike" cap="none" normalizeH="0" baseline="0" dirty="0">
-                <a:ln>
-                  <a:noFill/>
-                </a:ln>
-                <a:solidFill>
-                  <a:srgbClr val="065588"/>
-                </a:solidFill>
-                <a:effectLst/>
-                <a:latin typeface="Times New Roman" panose="02020603050405020304" pitchFamily="18" charset="0"/>
-                <a:ea typeface="+mj-ea"/>
-                <a:cs typeface="Times New Roman" panose="02020603050405020304" pitchFamily="18" charset="0"/>
-                <a:hlinkClick r:id="rId9"/>
-              </a:rPr>
-              <a:t>谱聚类原理 - Machine Learning (gitbooks.io)</a:t>
-            </a:r>
-            <a:endParaRPr kumimoji="0" lang="zh-CN" altLang="zh-CN" sz="1800" b="0" i="0" u="none" strike="noStrike" cap="none" normalizeH="0" baseline="0" dirty="0">
-              <a:ln>
-                <a:noFill/>
-              </a:ln>
-              <a:solidFill>
-                <a:srgbClr val="1F0909"/>
-              </a:solidFill>
-              <a:effectLst/>
-              <a:latin typeface="Times New Roman" panose="02020603050405020304" pitchFamily="18" charset="0"/>
-              <a:ea typeface="+mj-ea"/>
-              <a:cs typeface="Times New Roman" panose="02020603050405020304" pitchFamily="18" charset="0"/>
-            </a:endParaRPr>
-          </a:p>
-          <a:p>
-            <a:pPr marL="0" marR="0" lvl="0" indent="0" algn="l" defTabSz="914400" rtl="0" eaLnBrk="0" fontAlgn="base" latinLnBrk="0" hangingPunct="0">
-              <a:lnSpc>
-                <a:spcPct val="150000"/>
-              </a:lnSpc>
-              <a:spcBef>
-                <a:spcPct val="0"/>
-              </a:spcBef>
-              <a:spcAft>
-                <a:spcPct val="0"/>
-              </a:spcAft>
-              <a:buClrTx/>
-              <a:buSzTx/>
-              <a:buFontTx/>
-              <a:buAutoNum type="arabicPeriod" startAt="8"/>
-              <a:tabLst/>
-            </a:pPr>
-            <a:r>
-              <a:rPr kumimoji="0" lang="zh-CN" altLang="zh-CN" sz="1800" b="0" i="0" u="none" strike="noStrike" cap="none" normalizeH="0" baseline="0" dirty="0">
-                <a:ln>
-                  <a:noFill/>
-                </a:ln>
-                <a:solidFill>
-                  <a:srgbClr val="065588"/>
-                </a:solidFill>
-                <a:effectLst/>
-                <a:latin typeface="Times New Roman" panose="02020603050405020304" pitchFamily="18" charset="0"/>
-                <a:ea typeface="+mj-ea"/>
-                <a:cs typeface="Times New Roman" panose="02020603050405020304" pitchFamily="18" charset="0"/>
-                <a:hlinkClick r:id="rId10"/>
-              </a:rPr>
-              <a:t>伯努利分布 - 百度百科</a:t>
-            </a:r>
-            <a:endParaRPr kumimoji="0" lang="zh-CN" altLang="zh-CN" sz="1800" b="0" i="0" u="none" strike="noStrike" cap="none" normalizeH="0" baseline="0" dirty="0">
-              <a:ln>
-                <a:noFill/>
-              </a:ln>
-              <a:solidFill>
-                <a:srgbClr val="1F0909"/>
-              </a:solidFill>
-              <a:effectLst/>
-              <a:latin typeface="Times New Roman" panose="02020603050405020304" pitchFamily="18" charset="0"/>
-              <a:ea typeface="+mj-ea"/>
-              <a:cs typeface="Times New Roman" panose="02020603050405020304" pitchFamily="18" charset="0"/>
-            </a:endParaRPr>
-          </a:p>
-          <a:p>
-            <a:pPr marL="0" marR="0" lvl="0" indent="0" algn="l" defTabSz="914400" rtl="0" eaLnBrk="0" fontAlgn="base" latinLnBrk="0" hangingPunct="0">
-              <a:lnSpc>
-                <a:spcPct val="150000"/>
-              </a:lnSpc>
-              <a:spcBef>
-                <a:spcPct val="0"/>
-              </a:spcBef>
-              <a:spcAft>
-                <a:spcPct val="0"/>
-              </a:spcAft>
-              <a:buClrTx/>
-              <a:buSzTx/>
-              <a:buFontTx/>
-              <a:buAutoNum type="arabicPeriod" startAt="9"/>
-              <a:tabLst/>
-            </a:pPr>
-            <a:r>
-              <a:rPr kumimoji="0" lang="zh-CN" altLang="zh-CN" sz="1800" b="0" i="0" u="none" strike="noStrike" cap="none" normalizeH="0" baseline="0" dirty="0">
-                <a:ln>
-                  <a:noFill/>
-                </a:ln>
-                <a:solidFill>
-                  <a:srgbClr val="065588"/>
-                </a:solidFill>
-                <a:effectLst/>
-                <a:latin typeface="Times New Roman" panose="02020603050405020304" pitchFamily="18" charset="0"/>
-                <a:ea typeface="+mj-ea"/>
-                <a:cs typeface="Times New Roman" panose="02020603050405020304" pitchFamily="18" charset="0"/>
-                <a:hlinkClick r:id="rId11"/>
-              </a:rPr>
-              <a:t>正交匹配追踪算法 - CSDN</a:t>
-            </a:r>
-            <a:endParaRPr kumimoji="0" lang="zh-CN" altLang="zh-CN" sz="1800" b="0" i="0" u="none" strike="noStrike" cap="none" normalizeH="0" baseline="0" dirty="0">
-              <a:ln>
-                <a:noFill/>
-              </a:ln>
-              <a:solidFill>
-                <a:srgbClr val="1F0909"/>
-              </a:solidFill>
-              <a:effectLst/>
-              <a:latin typeface="Times New Roman" panose="02020603050405020304" pitchFamily="18" charset="0"/>
-              <a:ea typeface="+mj-ea"/>
-              <a:cs typeface="Times New Roman" panose="02020603050405020304" pitchFamily="18" charset="0"/>
-            </a:endParaRPr>
-          </a:p>
-          <a:p>
-            <a:pPr marL="0" marR="0" lvl="0" indent="0" algn="l" defTabSz="914400" rtl="0" eaLnBrk="0" fontAlgn="base" latinLnBrk="0" hangingPunct="0">
-              <a:lnSpc>
-                <a:spcPct val="150000"/>
-              </a:lnSpc>
-              <a:spcBef>
-                <a:spcPct val="0"/>
-              </a:spcBef>
-              <a:spcAft>
-                <a:spcPct val="0"/>
-              </a:spcAft>
-              <a:buClrTx/>
-              <a:buSzTx/>
-              <a:buFontTx/>
-              <a:buAutoNum type="arabicPeriod" startAt="10"/>
-              <a:tabLst/>
-            </a:pPr>
-            <a:r>
-              <a:rPr kumimoji="0" lang="zh-CN" altLang="zh-CN" sz="1800" b="0" i="0" u="none" strike="noStrike" cap="none" normalizeH="0" baseline="0" dirty="0">
-                <a:ln>
-                  <a:noFill/>
-                </a:ln>
-                <a:solidFill>
-                  <a:srgbClr val="065588"/>
-                </a:solidFill>
-                <a:effectLst/>
-                <a:latin typeface="Times New Roman" panose="02020603050405020304" pitchFamily="18" charset="0"/>
-                <a:ea typeface="+mj-ea"/>
-                <a:cs typeface="Times New Roman" panose="02020603050405020304" pitchFamily="18" charset="0"/>
-                <a:hlinkClick r:id="rId12"/>
-              </a:rPr>
-              <a:t>Orthogonal matching pursuit: recursive function approximation with applications to wavelet decomposi - Signals, Systems and Computers, 1993. 1993 Conference Record of The Twenty-Seventh Asilomar Confer (neu.edu)</a:t>
-            </a:r>
-            <a:endParaRPr kumimoji="0" lang="zh-CN" altLang="zh-CN" sz="1800" b="0" i="0" u="none" strike="noStrike" cap="none" normalizeH="0" baseline="0" dirty="0">
-              <a:ln>
-                <a:noFill/>
-              </a:ln>
-              <a:solidFill>
-                <a:srgbClr val="1F0909"/>
-              </a:solidFill>
-              <a:effectLst/>
-              <a:latin typeface="Times New Roman" panose="02020603050405020304" pitchFamily="18" charset="0"/>
-              <a:ea typeface="+mj-ea"/>
-              <a:cs typeface="Times New Roman" panose="02020603050405020304" pitchFamily="18" charset="0"/>
-            </a:endParaRPr>
-          </a:p>
-          <a:p>
-            <a:pPr marL="0" marR="0" lvl="0" indent="0" algn="l" defTabSz="914400" rtl="0" eaLnBrk="0" fontAlgn="base" latinLnBrk="0" hangingPunct="0">
-              <a:lnSpc>
-                <a:spcPct val="100000"/>
-              </a:lnSpc>
-              <a:spcBef>
-                <a:spcPct val="0"/>
-              </a:spcBef>
-              <a:spcAft>
-                <a:spcPct val="0"/>
-              </a:spcAft>
-              <a:buClrTx/>
-              <a:buSzTx/>
-              <a:buFontTx/>
-              <a:buNone/>
-              <a:tabLst/>
-            </a:pPr>
-            <a:endParaRPr kumimoji="0" lang="zh-CN" altLang="zh-CN" sz="1800" b="0" i="0" u="none" strike="noStrike" cap="none" normalizeH="0" baseline="0" dirty="0">
-              <a:ln>
-                <a:noFill/>
-              </a:ln>
-              <a:solidFill>
-                <a:schemeClr val="tx1"/>
-              </a:solidFill>
-              <a:effectLst/>
-              <a:latin typeface="Times New Roman" panose="02020603050405020304" pitchFamily="18" charset="0"/>
-              <a:ea typeface="+mj-ea"/>
-              <a:cs typeface="Times New Roman" panose="02020603050405020304" pitchFamily="18" charset="0"/>
-            </a:endParaRPr>
+            <a:endParaRPr lang="zh-CN" altLang="en-US" sz="3600" dirty="0"/>
           </a:p>
         </p:txBody>
       </p:sp>
@@ -18380,7 +18425,7 @@
                                           </p:stCondLst>
                                         </p:cTn>
                                         <p:tgtEl>
-                                          <p:spTgt spid="4"/>
+                                          <p:spTgt spid="6"/>
                                         </p:tgtEl>
                                         <p:attrNameLst>
                                           <p:attrName>style.visibility</p:attrName>
@@ -18394,10 +18439,109 @@
                                       <p:cBhvr>
                                         <p:cTn id="7" dur="500"/>
                                         <p:tgtEl>
+                                          <p:spTgt spid="6"/>
+                                        </p:tgtEl>
+                                      </p:cBhvr>
+                                    </p:animEffect>
+                                  </p:childTnLst>
+                                </p:cTn>
+                              </p:par>
+                            </p:childTnLst>
+                          </p:cTn>
+                        </p:par>
+                      </p:childTnLst>
+                    </p:cTn>
+                  </p:par>
+                  <p:par>
+                    <p:cTn id="8" fill="hold">
+                      <p:stCondLst>
+                        <p:cond delay="indefinite"/>
+                      </p:stCondLst>
+                      <p:childTnLst>
+                        <p:par>
+                          <p:cTn id="9" fill="hold">
+                            <p:stCondLst>
+                              <p:cond delay="0"/>
+                            </p:stCondLst>
+                            <p:childTnLst>
+                              <p:par>
+                                <p:cTn id="10" presetID="42" presetClass="entr" presetSubtype="0" fill="hold" grpId="0" nodeType="clickEffect">
+                                  <p:stCondLst>
+                                    <p:cond delay="0"/>
+                                  </p:stCondLst>
+                                  <p:childTnLst>
+                                    <p:set>
+                                      <p:cBhvr>
+                                        <p:cTn id="11" dur="1" fill="hold">
+                                          <p:stCondLst>
+                                            <p:cond delay="0"/>
+                                          </p:stCondLst>
+                                        </p:cTn>
+                                        <p:tgtEl>
+                                          <p:spTgt spid="4"/>
+                                        </p:tgtEl>
+                                        <p:attrNameLst>
+                                          <p:attrName>style.visibility</p:attrName>
+                                        </p:attrNameLst>
+                                      </p:cBhvr>
+                                      <p:to>
+                                        <p:strVal val="visible"/>
+                                      </p:to>
+                                    </p:set>
+                                    <p:animEffect transition="in" filter="fade">
+                                      <p:cBhvr>
+                                        <p:cTn id="12" dur="1000"/>
+                                        <p:tgtEl>
                                           <p:spTgt spid="4"/>
                                         </p:tgtEl>
                                       </p:cBhvr>
                                     </p:animEffect>
+                                    <p:anim calcmode="lin" valueType="num">
+                                      <p:cBhvr>
+                                        <p:cTn id="13" dur="1000" fill="hold"/>
+                                        <p:tgtEl>
+                                          <p:spTgt spid="4"/>
+                                        </p:tgtEl>
+                                        <p:attrNameLst>
+                                          <p:attrName>ppt_x</p:attrName>
+                                        </p:attrNameLst>
+                                      </p:cBhvr>
+                                      <p:tavLst>
+                                        <p:tav tm="0">
+                                          <p:val>
+                                            <p:strVal val="#ppt_x"/>
+                                          </p:val>
+                                        </p:tav>
+                                        <p:tav tm="100000">
+                                          <p:val>
+                                            <p:strVal val="#ppt_x"/>
+                                          </p:val>
+                                        </p:tav>
+                                      </p:tavLst>
+                                    </p:anim>
+                                    <p:anim calcmode="lin" valueType="num">
+                                      <p:cBhvr>
+                                        <p:cTn id="14" dur="1000" fill="hold"/>
+                                        <p:tgtEl>
+                                          <p:spTgt spid="4"/>
+                                        </p:tgtEl>
+                                        <p:attrNameLst>
+                                          <p:attrName>ppt_y</p:attrName>
+                                        </p:attrNameLst>
+                                      </p:cBhvr>
+                                      <p:tavLst>
+                                        <p:tav tm="0">
+                                          <p:val>
+                                            <p:strVal val="#ppt_y+.1"/>
+                                          </p:val>
+                                        </p:tav>
+                                        <p:tav tm="100000">
+                                          <p:val>
+                                            <p:strVal val="#ppt_y"/>
+                                          </p:val>
+                                        </p:tav>
+                                      </p:tavLst>
+                                    </p:anim>
                                   </p:childTnLst>
                                 </p:cTn>
                               </p:par>
@@ -18429,6 +18573,7 @@
       </p:par>
     </p:tnLst>
     <p:bldLst>
+      <p:bldP spid="6" grpId="0"/>
       <p:bldP spid="4" grpId="0"/>
     </p:bldLst>
   </p:timing>
@@ -19847,7 +19992,7 @@
                     <a:latin typeface="Times New Roman" panose="02020603050405020304" pitchFamily="18" charset="0"/>
                     <a:cs typeface="Times New Roman" panose="02020603050405020304" pitchFamily="18" charset="0"/>
                   </a:rPr>
-                  <a:t>preserving Property</a:t>
+                  <a:t>Preserving Property</a:t>
                 </a:r>
                 <a:r>
                   <a:rPr lang="en-US" altLang="zh-CN" sz="2400" dirty="0">
@@ -20078,7 +20223,7 @@
               <a:blipFill>
                 <a:blip r:embed="rId6"/>
                 <a:stretch>
-                  <a:fillRect l="-1043" t="-5042" r="-580"/>
+                  <a:fillRect l="-1043" t="-5042" r="-696"/>
                 </a:stretch>
               </a:blipFill>
             </p:spPr>
@@ -21920,7 +22065,28 @@
                     <a:latin typeface="Times New Roman" panose="02020603050405020304" pitchFamily="18" charset="0"/>
                     <a:cs typeface="Times New Roman" panose="02020603050405020304" pitchFamily="18" charset="0"/>
                   </a:rPr>
-                  <a:t>ta and real world benchmark data, and demonstrate the state-of-the-art performance of our proposal. </a:t>
+                  <a:t>ta and real world benchmark data, and demonstrate the state-of-the-art performance of </a:t>
+                </a:r>
+                <a:r>
+                  <a:rPr lang="en-US" altLang="zh-CN" sz="2400" dirty="0">
+                    <a:solidFill>
+                      <a:srgbClr val="000000"/>
+                    </a:solidFill>
+                    <a:latin typeface="Times New Roman" panose="02020603050405020304" pitchFamily="18" charset="0"/>
+                    <a:cs typeface="Times New Roman" panose="02020603050405020304" pitchFamily="18" charset="0"/>
+                  </a:rPr>
+                  <a:t>the</a:t>
+                </a:r>
+                <a:r>
+                  <a:rPr lang="en-US" altLang="zh-CN" sz="2400" dirty="0">
+                    <a:solidFill>
+                      <a:srgbClr val="000000"/>
+                    </a:solidFill>
+                    <a:effectLst/>
+                    <a:latin typeface="Times New Roman" panose="02020603050405020304" pitchFamily="18" charset="0"/>
+                    <a:cs typeface="Times New Roman" panose="02020603050405020304" pitchFamily="18" charset="0"/>
+                  </a:rPr>
+                  <a:t> proposal. </a:t>
                 </a:r>
                 <a:endParaRPr lang="zh-CN" altLang="en-US" sz="4400" dirty="0">
                   <a:latin typeface="Times New Roman" panose="02020603050405020304" pitchFamily="18" charset="0"/>

</xml_diff>